<commit_message>
docs and unity version up!
</commit_message>
<xml_diff>
--- a/Documents/소마문서/발표PPT/MomentFlow4차역량강화스터디.pptx
+++ b/Documents/소마문서/발표PPT/MomentFlow4차역량강화스터디.pptx
@@ -5,17 +5,16 @@
     <p:sldMasterId id="2147483648" r:id="rId1"/>
   </p:sldMasterIdLst>
   <p:notesMasterIdLst>
-    <p:notesMasterId r:id="rId10"/>
+    <p:notesMasterId r:id="rId9"/>
   </p:notesMasterIdLst>
   <p:sldIdLst>
     <p:sldId id="256" r:id="rId2"/>
     <p:sldId id="314" r:id="rId3"/>
-    <p:sldId id="315" r:id="rId4"/>
-    <p:sldId id="316" r:id="rId5"/>
-    <p:sldId id="318" r:id="rId6"/>
-    <p:sldId id="317" r:id="rId7"/>
-    <p:sldId id="319" r:id="rId8"/>
-    <p:sldId id="262" r:id="rId9"/>
+    <p:sldId id="316" r:id="rId4"/>
+    <p:sldId id="318" r:id="rId5"/>
+    <p:sldId id="317" r:id="rId6"/>
+    <p:sldId id="319" r:id="rId7"/>
+    <p:sldId id="262" r:id="rId8"/>
   </p:sldIdLst>
   <p:sldSz cx="12192000" cy="6858000"/>
   <p:notesSz cx="6858000" cy="9144000"/>
@@ -116,7 +115,18 @@
   </p:defaultTextStyle>
   <p:extLst>
     <p:ext uri="{EFAFB233-063F-42B5-8137-9DF3F51BA10A}">
-      <p15:sldGuideLst xmlns:p15="http://schemas.microsoft.com/office/powerpoint/2012/main"/>
+      <p15:sldGuideLst xmlns:p15="http://schemas.microsoft.com/office/powerpoint/2012/main">
+        <p15:guide id="1" orient="horz" pos="2387" userDrawn="1">
+          <p15:clr>
+            <a:srgbClr val="A4A3A4"/>
+          </p15:clr>
+        </p15:guide>
+        <p15:guide id="2" pos="3840" userDrawn="1">
+          <p15:clr>
+            <a:srgbClr val="A4A3A4"/>
+          </p15:clr>
+        </p15:guide>
+      </p15:sldGuideLst>
     </p:ext>
   </p:extLst>
 </p:presentation>
@@ -4185,100 +4195,6 @@
       </p:grpSp>
       <p:sp>
         <p:nvSpPr>
-          <p:cNvPr id="22" name="직사각형 21"/>
-          <p:cNvSpPr/>
-          <p:nvPr/>
-        </p:nvSpPr>
-        <p:spPr>
-          <a:xfrm>
-            <a:off x="8910608" y="-8817"/>
-            <a:ext cx="3303931" cy="6858000"/>
-          </a:xfrm>
-          <a:prstGeom prst="rect">
-            <a:avLst/>
-          </a:prstGeom>
-          <a:solidFill>
-            <a:schemeClr val="tx2">
-              <a:lumMod val="75000"/>
-            </a:schemeClr>
-          </a:solidFill>
-          <a:ln>
-            <a:noFill/>
-          </a:ln>
-        </p:spPr>
-        <p:style>
-          <a:lnRef idx="2">
-            <a:schemeClr val="accent1">
-              <a:shade val="50000"/>
-            </a:schemeClr>
-          </a:lnRef>
-          <a:fillRef idx="1">
-            <a:schemeClr val="accent1"/>
-          </a:fillRef>
-          <a:effectRef idx="0">
-            <a:schemeClr val="accent1"/>
-          </a:effectRef>
-          <a:fontRef idx="minor">
-            <a:schemeClr val="lt1"/>
-          </a:fontRef>
-        </p:style>
-        <p:txBody>
-          <a:bodyPr rtlCol="0" anchor="ctr"/>
-          <a:lstStyle/>
-          <a:p>
-            <a:pPr algn="ctr"/>
-            <a:endParaRPr lang="ko-KR" altLang="en-US" sz="2200" dirty="0"/>
-          </a:p>
-        </p:txBody>
-      </p:sp>
-      <p:sp>
-        <p:nvSpPr>
-          <p:cNvPr id="23" name="직각 삼각형 22"/>
-          <p:cNvSpPr/>
-          <p:nvPr/>
-        </p:nvSpPr>
-        <p:spPr>
-          <a:xfrm flipH="1">
-            <a:off x="10312768" y="5029200"/>
-            <a:ext cx="1901777" cy="1828800"/>
-          </a:xfrm>
-          <a:prstGeom prst="rtTriangle">
-            <a:avLst/>
-          </a:prstGeom>
-          <a:solidFill>
-            <a:schemeClr val="bg1"/>
-          </a:solidFill>
-          <a:ln>
-            <a:noFill/>
-          </a:ln>
-        </p:spPr>
-        <p:style>
-          <a:lnRef idx="2">
-            <a:schemeClr val="accent1">
-              <a:shade val="50000"/>
-            </a:schemeClr>
-          </a:lnRef>
-          <a:fillRef idx="1">
-            <a:schemeClr val="accent1"/>
-          </a:fillRef>
-          <a:effectRef idx="0">
-            <a:schemeClr val="accent1"/>
-          </a:effectRef>
-          <a:fontRef idx="minor">
-            <a:schemeClr val="lt1"/>
-          </a:fontRef>
-        </p:style>
-        <p:txBody>
-          <a:bodyPr rtlCol="0" anchor="ctr"/>
-          <a:lstStyle/>
-          <a:p>
-            <a:pPr algn="ctr"/>
-            <a:endParaRPr lang="ko-KR" altLang="en-US"/>
-          </a:p>
-        </p:txBody>
-      </p:sp>
-      <p:sp>
-        <p:nvSpPr>
           <p:cNvPr id="4" name="제목 3"/>
           <p:cNvSpPr>
             <a:spLocks noGrp="1"/>
@@ -4329,51 +4245,96 @@
           </a:p>
         </p:txBody>
       </p:sp>
-      <p:sp>
-        <p:nvSpPr>
-          <p:cNvPr id="11" name="TextBox 10"/>
-          <p:cNvSpPr txBox="1"/>
+      <p:pic>
+        <p:nvPicPr>
+          <p:cNvPr id="2" name="그림 1"/>
+          <p:cNvPicPr>
+            <a:picLocks noChangeAspect="1"/>
+          </p:cNvPicPr>
           <p:nvPr/>
-        </p:nvSpPr>
+        </p:nvPicPr>
+        <p:blipFill>
+          <a:blip r:embed="rId3">
+            <a:extLst>
+              <a:ext uri="{28A0092B-C50C-407E-A947-70E740481C1C}">
+                <a14:useLocalDpi xmlns:a14="http://schemas.microsoft.com/office/drawing/2010/main" val="0"/>
+              </a:ext>
+            </a:extLst>
+          </a:blip>
+          <a:stretch>
+            <a:fillRect/>
+          </a:stretch>
+        </p:blipFill>
         <p:spPr>
           <a:xfrm>
-            <a:off x="3255469" y="2986634"/>
-            <a:ext cx="2755687" cy="1200329"/>
+            <a:off x="2591444" y="2488770"/>
+            <a:ext cx="2601185" cy="2601185"/>
           </a:xfrm>
           <a:prstGeom prst="rect">
             <a:avLst/>
           </a:prstGeom>
-          <a:noFill/>
         </p:spPr>
-        <p:txBody>
-          <a:bodyPr wrap="square" rtlCol="0">
-            <a:spAutoFit/>
-          </a:bodyPr>
-          <a:lstStyle/>
-          <a:p>
-            <a:endParaRPr lang="en-US" altLang="ko-KR" dirty="0">
-              <a:solidFill>
-                <a:schemeClr val="bg1"/>
-              </a:solidFill>
-            </a:endParaRPr>
-          </a:p>
-          <a:p>
-            <a:r>
-              <a:rPr lang="ko-KR" altLang="en-US" dirty="0" smtClean="0">
-                <a:solidFill>
-                  <a:schemeClr val="bg1"/>
-                </a:solidFill>
-              </a:rPr>
-              <a:t>게임을 개발하고 스팀에 출시하는 것을 목표로 하고 있는 프로젝트</a:t>
-            </a:r>
-            <a:endParaRPr lang="en-US" altLang="ko-KR" dirty="0">
-              <a:solidFill>
-                <a:schemeClr val="bg1"/>
-              </a:solidFill>
-            </a:endParaRPr>
-          </a:p>
-        </p:txBody>
-      </p:sp>
+      </p:pic>
+      <p:pic>
+        <p:nvPicPr>
+          <p:cNvPr id="3" name="그림 2"/>
+          <p:cNvPicPr>
+            <a:picLocks noChangeAspect="1"/>
+          </p:cNvPicPr>
+          <p:nvPr/>
+        </p:nvPicPr>
+        <p:blipFill>
+          <a:blip r:embed="rId4">
+            <a:extLst>
+              <a:ext uri="{28A0092B-C50C-407E-A947-70E740481C1C}">
+                <a14:useLocalDpi xmlns:a14="http://schemas.microsoft.com/office/drawing/2010/main" val="0"/>
+              </a:ext>
+            </a:extLst>
+          </a:blip>
+          <a:stretch>
+            <a:fillRect/>
+          </a:stretch>
+        </p:blipFill>
+        <p:spPr>
+          <a:xfrm>
+            <a:off x="7214725" y="2488770"/>
+            <a:ext cx="2601185" cy="2601185"/>
+          </a:xfrm>
+          <a:prstGeom prst="rect">
+            <a:avLst/>
+          </a:prstGeom>
+        </p:spPr>
+      </p:pic>
+      <p:pic>
+        <p:nvPicPr>
+          <p:cNvPr id="5" name="그림 4"/>
+          <p:cNvPicPr>
+            <a:picLocks noChangeAspect="1"/>
+          </p:cNvPicPr>
+          <p:nvPr/>
+        </p:nvPicPr>
+        <p:blipFill>
+          <a:blip r:embed="rId5" cstate="print">
+            <a:extLst>
+              <a:ext uri="{28A0092B-C50C-407E-A947-70E740481C1C}">
+                <a14:useLocalDpi xmlns:a14="http://schemas.microsoft.com/office/drawing/2010/main" val="0"/>
+              </a:ext>
+            </a:extLst>
+          </a:blip>
+          <a:stretch>
+            <a:fillRect/>
+          </a:stretch>
+        </p:blipFill>
+        <p:spPr>
+          <a:xfrm>
+            <a:off x="5785246" y="3370931"/>
+            <a:ext cx="836861" cy="836861"/>
+          </a:xfrm>
+          <a:prstGeom prst="rect">
+            <a:avLst/>
+          </a:prstGeom>
+        </p:spPr>
+      </p:pic>
     </p:spTree>
     <p:extLst>
       <p:ext uri="{BB962C8B-B14F-4D97-AF65-F5344CB8AC3E}">
@@ -4396,9 +4357,6 @@
                     <p:cTn id="3" fill="hold">
                       <p:stCondLst>
                         <p:cond delay="indefinite"/>
-                        <p:cond evt="onBegin" delay="0">
-                          <p:tn val="2"/>
-                        </p:cond>
                       </p:stCondLst>
                       <p:childTnLst>
                         <p:par>
@@ -4408,7 +4366,7 @@
                             </p:stCondLst>
                             <p:childTnLst>
                               <p:par>
-                                <p:cTn id="5" presetID="2" presetClass="entr" presetSubtype="2" fill="hold" grpId="0" nodeType="withEffect">
+                                <p:cTn id="5" presetID="10" presetClass="entr" presetSubtype="0" fill="hold" nodeType="clickEffect">
                                   <p:stCondLst>
                                     <p:cond delay="0"/>
                                   </p:stCondLst>
@@ -4421,80 +4379,7 @@
                                           </p:stCondLst>
                                         </p:cTn>
                                         <p:tgtEl>
-                                          <p:spTgt spid="22"/>
-                                        </p:tgtEl>
-                                        <p:attrNameLst>
-                                          <p:attrName>style.visibility</p:attrName>
-                                        </p:attrNameLst>
-                                      </p:cBhvr>
-                                      <p:to>
-                                        <p:strVal val="visible"/>
-                                      </p:to>
-                                    </p:set>
-                                    <p:anim calcmode="lin" valueType="num">
-                                      <p:cBhvr additive="base">
-                                        <p:cTn id="7" dur="500" fill="hold"/>
-                                        <p:tgtEl>
-                                          <p:spTgt spid="22"/>
-                                        </p:tgtEl>
-                                        <p:attrNameLst>
-                                          <p:attrName>ppt_x</p:attrName>
-                                        </p:attrNameLst>
-                                      </p:cBhvr>
-                                      <p:tavLst>
-                                        <p:tav tm="0">
-                                          <p:val>
-                                            <p:strVal val="1+#ppt_w/2"/>
-                                          </p:val>
-                                        </p:tav>
-                                        <p:tav tm="100000">
-                                          <p:val>
-                                            <p:strVal val="#ppt_x"/>
-                                          </p:val>
-                                        </p:tav>
-                                      </p:tavLst>
-                                    </p:anim>
-                                    <p:anim calcmode="lin" valueType="num">
-                                      <p:cBhvr additive="base">
-                                        <p:cTn id="8" dur="500" fill="hold"/>
-                                        <p:tgtEl>
-                                          <p:spTgt spid="22"/>
-                                        </p:tgtEl>
-                                        <p:attrNameLst>
-                                          <p:attrName>ppt_y</p:attrName>
-                                        </p:attrNameLst>
-                                      </p:cBhvr>
-                                      <p:tavLst>
-                                        <p:tav tm="0">
-                                          <p:val>
-                                            <p:strVal val="#ppt_y"/>
-                                          </p:val>
-                                        </p:tav>
-                                        <p:tav tm="100000">
-                                          <p:val>
-                                            <p:strVal val="#ppt_y"/>
-                                          </p:val>
-                                        </p:tav>
-                                      </p:tavLst>
-                                    </p:anim>
-                                  </p:childTnLst>
-                                </p:cTn>
-                              </p:par>
-                              <p:par>
-                                <p:cTn id="9" presetID="42" presetClass="entr" presetSubtype="0" fill="hold" grpId="0" nodeType="withEffect">
-                                  <p:stCondLst>
-                                    <p:cond delay="500"/>
-                                  </p:stCondLst>
-                                  <p:childTnLst>
-                                    <p:set>
-                                      <p:cBhvr>
-                                        <p:cTn id="10" dur="1" fill="hold">
-                                          <p:stCondLst>
-                                            <p:cond delay="0"/>
-                                          </p:stCondLst>
-                                        </p:cTn>
-                                        <p:tgtEl>
-                                          <p:spTgt spid="23"/>
+                                          <p:spTgt spid="2"/>
                                         </p:tgtEl>
                                         <p:attrNameLst>
                                           <p:attrName>style.visibility</p:attrName>
@@ -4506,76 +4391,48 @@
                                     </p:set>
                                     <p:animEffect transition="in" filter="fade">
                                       <p:cBhvr>
-                                        <p:cTn id="11" dur="1000"/>
+                                        <p:cTn id="7" dur="500"/>
                                         <p:tgtEl>
-                                          <p:spTgt spid="23"/>
+                                          <p:spTgt spid="2"/>
                                         </p:tgtEl>
                                       </p:cBhvr>
                                     </p:animEffect>
-                                    <p:anim calcmode="lin" valueType="num">
-                                      <p:cBhvr>
-                                        <p:cTn id="12" dur="1000" fill="hold"/>
-                                        <p:tgtEl>
-                                          <p:spTgt spid="23"/>
-                                        </p:tgtEl>
-                                        <p:attrNameLst>
-                                          <p:attrName>ppt_x</p:attrName>
-                                        </p:attrNameLst>
-                                      </p:cBhvr>
-                                      <p:tavLst>
-                                        <p:tav tm="0">
-                                          <p:val>
-                                            <p:strVal val="#ppt_x"/>
-                                          </p:val>
-                                        </p:tav>
-                                        <p:tav tm="100000">
-                                          <p:val>
-                                            <p:strVal val="#ppt_x"/>
-                                          </p:val>
-                                        </p:tav>
-                                      </p:tavLst>
-                                    </p:anim>
-                                    <p:anim calcmode="lin" valueType="num">
-                                      <p:cBhvr>
-                                        <p:cTn id="13" dur="1000" fill="hold"/>
-                                        <p:tgtEl>
-                                          <p:spTgt spid="23"/>
-                                        </p:tgtEl>
-                                        <p:attrNameLst>
-                                          <p:attrName>ppt_y</p:attrName>
-                                        </p:attrNameLst>
-                                      </p:cBhvr>
-                                      <p:tavLst>
-                                        <p:tav tm="0">
-                                          <p:val>
-                                            <p:strVal val="#ppt_y+.1"/>
-                                          </p:val>
-                                        </p:tav>
-                                        <p:tav tm="100000">
-                                          <p:val>
-                                            <p:strVal val="#ppt_y"/>
-                                          </p:val>
-                                        </p:tav>
-                                      </p:tavLst>
-                                    </p:anim>
                                   </p:childTnLst>
                                 </p:cTn>
                               </p:par>
+                            </p:childTnLst>
+                          </p:cTn>
+                        </p:par>
+                      </p:childTnLst>
+                    </p:cTn>
+                  </p:par>
+                  <p:par>
+                    <p:cTn id="8" fill="hold">
+                      <p:stCondLst>
+                        <p:cond delay="indefinite"/>
+                      </p:stCondLst>
+                      <p:childTnLst>
+                        <p:par>
+                          <p:cTn id="9" fill="hold">
+                            <p:stCondLst>
+                              <p:cond delay="0"/>
+                            </p:stCondLst>
+                            <p:childTnLst>
                               <p:par>
-                                <p:cTn id="14" presetID="10" presetClass="entr" presetSubtype="0" fill="hold" grpId="0" nodeType="withEffect">
+                                <p:cTn id="10" presetID="10" presetClass="entr" presetSubtype="0" fill="hold" nodeType="clickEffect">
                                   <p:stCondLst>
-                                    <p:cond delay="500"/>
+                                    <p:cond delay="0"/>
                                   </p:stCondLst>
                                   <p:childTnLst>
                                     <p:set>
                                       <p:cBhvr>
-                                        <p:cTn id="15" dur="1" fill="hold">
+                                        <p:cTn id="11" dur="1" fill="hold">
                                           <p:stCondLst>
                                             <p:cond delay="0"/>
                                           </p:stCondLst>
                                         </p:cTn>
                                         <p:tgtEl>
-                                          <p:spTgt spid="11"/>
+                                          <p:spTgt spid="5"/>
                                         </p:tgtEl>
                                         <p:attrNameLst>
                                           <p:attrName>style.visibility</p:attrName>
@@ -4587,9 +4444,62 @@
                                     </p:set>
                                     <p:animEffect transition="in" filter="fade">
                                       <p:cBhvr>
-                                        <p:cTn id="16" dur="500"/>
+                                        <p:cTn id="12" dur="500"/>
                                         <p:tgtEl>
-                                          <p:spTgt spid="11"/>
+                                          <p:spTgt spid="5"/>
+                                        </p:tgtEl>
+                                      </p:cBhvr>
+                                    </p:animEffect>
+                                  </p:childTnLst>
+                                </p:cTn>
+                              </p:par>
+                            </p:childTnLst>
+                          </p:cTn>
+                        </p:par>
+                      </p:childTnLst>
+                    </p:cTn>
+                  </p:par>
+                  <p:par>
+                    <p:cTn id="13" fill="hold">
+                      <p:stCondLst>
+                        <p:cond delay="indefinite"/>
+                      </p:stCondLst>
+                      <p:childTnLst>
+                        <p:par>
+                          <p:cTn id="14" fill="hold">
+                            <p:stCondLst>
+                              <p:cond delay="0"/>
+                            </p:stCondLst>
+                            <p:childTnLst>
+                              <p:par>
+                                <p:cTn id="15" presetID="10" presetClass="entr" presetSubtype="0" fill="hold" nodeType="clickEffect">
+                                  <p:stCondLst>
+                                    <p:cond delay="0"/>
+                                  </p:stCondLst>
+                                  <p:childTnLst>
+                                    <p:set>
+                                      <p:cBhvr>
+                                        <p:cTn id="16" dur="1" fill="hold">
+                                          <p:stCondLst>
+                                            <p:cond delay="0"/>
+                                          </p:stCondLst>
+                                        </p:cTn>
+                                        <p:tgtEl>
+                                          <p:spTgt spid="3"/>
+                                        </p:tgtEl>
+                                        <p:attrNameLst>
+                                          <p:attrName>style.visibility</p:attrName>
+                                        </p:attrNameLst>
+                                      </p:cBhvr>
+                                      <p:to>
+                                        <p:strVal val="visible"/>
+                                      </p:to>
+                                    </p:set>
+                                    <p:animEffect transition="in" filter="fade">
+                                      <p:cBhvr>
+                                        <p:cTn id="17" dur="500"/>
+                                        <p:tgtEl>
+                                          <p:spTgt spid="3"/>
                                         </p:tgtEl>
                                       </p:cBhvr>
                                     </p:animEffect>
@@ -4623,11 +4533,6 @@
         </p:cTn>
       </p:par>
     </p:tnLst>
-    <p:bldLst>
-      <p:bldP spid="22" grpId="0" animBg="1"/>
-      <p:bldP spid="23" grpId="0" animBg="1"/>
-      <p:bldP spid="11" grpId="0"/>
-    </p:bldLst>
   </p:timing>
 </p:sld>
 </file>
@@ -4956,100 +4861,6 @@
       </p:grpSp>
       <p:sp>
         <p:nvSpPr>
-          <p:cNvPr id="22" name="직사각형 21"/>
-          <p:cNvSpPr/>
-          <p:nvPr/>
-        </p:nvSpPr>
-        <p:spPr>
-          <a:xfrm>
-            <a:off x="8910608" y="-8817"/>
-            <a:ext cx="3303931" cy="6858000"/>
-          </a:xfrm>
-          <a:prstGeom prst="rect">
-            <a:avLst/>
-          </a:prstGeom>
-          <a:solidFill>
-            <a:schemeClr val="tx2">
-              <a:lumMod val="75000"/>
-            </a:schemeClr>
-          </a:solidFill>
-          <a:ln>
-            <a:noFill/>
-          </a:ln>
-        </p:spPr>
-        <p:style>
-          <a:lnRef idx="2">
-            <a:schemeClr val="accent1">
-              <a:shade val="50000"/>
-            </a:schemeClr>
-          </a:lnRef>
-          <a:fillRef idx="1">
-            <a:schemeClr val="accent1"/>
-          </a:fillRef>
-          <a:effectRef idx="0">
-            <a:schemeClr val="accent1"/>
-          </a:effectRef>
-          <a:fontRef idx="minor">
-            <a:schemeClr val="lt1"/>
-          </a:fontRef>
-        </p:style>
-        <p:txBody>
-          <a:bodyPr rtlCol="0" anchor="ctr"/>
-          <a:lstStyle/>
-          <a:p>
-            <a:pPr algn="ctr"/>
-            <a:endParaRPr lang="ko-KR" altLang="en-US" sz="2200" dirty="0"/>
-          </a:p>
-        </p:txBody>
-      </p:sp>
-      <p:sp>
-        <p:nvSpPr>
-          <p:cNvPr id="23" name="직각 삼각형 22"/>
-          <p:cNvSpPr/>
-          <p:nvPr/>
-        </p:nvSpPr>
-        <p:spPr>
-          <a:xfrm flipH="1">
-            <a:off x="10312768" y="5029200"/>
-            <a:ext cx="1901777" cy="1828800"/>
-          </a:xfrm>
-          <a:prstGeom prst="rtTriangle">
-            <a:avLst/>
-          </a:prstGeom>
-          <a:solidFill>
-            <a:schemeClr val="bg1"/>
-          </a:solidFill>
-          <a:ln>
-            <a:noFill/>
-          </a:ln>
-        </p:spPr>
-        <p:style>
-          <a:lnRef idx="2">
-            <a:schemeClr val="accent1">
-              <a:shade val="50000"/>
-            </a:schemeClr>
-          </a:lnRef>
-          <a:fillRef idx="1">
-            <a:schemeClr val="accent1"/>
-          </a:fillRef>
-          <a:effectRef idx="0">
-            <a:schemeClr val="accent1"/>
-          </a:effectRef>
-          <a:fontRef idx="minor">
-            <a:schemeClr val="lt1"/>
-          </a:fontRef>
-        </p:style>
-        <p:txBody>
-          <a:bodyPr rtlCol="0" anchor="ctr"/>
-          <a:lstStyle/>
-          <a:p>
-            <a:pPr algn="ctr"/>
-            <a:endParaRPr lang="ko-KR" altLang="en-US"/>
-          </a:p>
-        </p:txBody>
-      </p:sp>
-      <p:sp>
-        <p:nvSpPr>
           <p:cNvPr id="4" name="제목 3"/>
           <p:cNvSpPr>
             <a:spLocks noGrp="1"/>
@@ -5074,7 +4885,7 @@
                   <a:schemeClr val="bg1"/>
                 </a:solidFill>
               </a:rPr>
-              <a:t>수업 내용</a:t>
+              <a:t>이번 달 한 것</a:t>
             </a:r>
             <a:endParaRPr lang="ko-KR" altLang="en-US" sz="3200" dirty="0">
               <a:solidFill>
@@ -5084,97 +4895,160 @@
           </a:p>
         </p:txBody>
       </p:sp>
-      <p:sp>
-        <p:nvSpPr>
-          <p:cNvPr id="11" name="TextBox 10"/>
-          <p:cNvSpPr txBox="1"/>
+      <p:pic>
+        <p:nvPicPr>
+          <p:cNvPr id="2" name="그림 1"/>
+          <p:cNvPicPr>
+            <a:picLocks noChangeAspect="1"/>
+          </p:cNvPicPr>
           <p:nvPr/>
-        </p:nvSpPr>
+        </p:nvPicPr>
+        <p:blipFill>
+          <a:blip r:embed="rId3" cstate="print">
+            <a:extLst>
+              <a:ext uri="{28A0092B-C50C-407E-A947-70E740481C1C}">
+                <a14:useLocalDpi xmlns:a14="http://schemas.microsoft.com/office/drawing/2010/main" val="0"/>
+              </a:ext>
+            </a:extLst>
+          </a:blip>
+          <a:stretch>
+            <a:fillRect/>
+          </a:stretch>
+        </p:blipFill>
         <p:spPr>
           <a:xfrm>
-            <a:off x="3255469" y="2986634"/>
-            <a:ext cx="2755687" cy="923330"/>
+            <a:off x="778645" y="1855237"/>
+            <a:ext cx="2928690" cy="4142063"/>
           </a:xfrm>
           <a:prstGeom prst="rect">
             <a:avLst/>
           </a:prstGeom>
-          <a:noFill/>
         </p:spPr>
-        <p:txBody>
-          <a:bodyPr wrap="square" rtlCol="0">
-            <a:spAutoFit/>
-          </a:bodyPr>
-          <a:lstStyle/>
-          <a:p>
-            <a:endParaRPr lang="en-US" altLang="ko-KR" dirty="0">
-              <a:solidFill>
-                <a:schemeClr val="bg1"/>
-              </a:solidFill>
-            </a:endParaRPr>
-          </a:p>
-          <a:p>
-            <a:r>
-              <a:rPr lang="ko-KR" altLang="en-US" dirty="0" smtClean="0">
-                <a:solidFill>
-                  <a:schemeClr val="bg1"/>
-                </a:solidFill>
-              </a:rPr>
-              <a:t>오픈 </a:t>
-            </a:r>
-            <a:r>
-              <a:rPr lang="ko-KR" altLang="en-US" dirty="0" err="1" smtClean="0">
-                <a:solidFill>
-                  <a:schemeClr val="bg1"/>
-                </a:solidFill>
-              </a:rPr>
-              <a:t>스택</a:t>
-            </a:r>
-            <a:r>
-              <a:rPr lang="en-US" altLang="ko-KR" dirty="0" smtClean="0">
-                <a:solidFill>
-                  <a:schemeClr val="bg1"/>
-                </a:solidFill>
-              </a:rPr>
-              <a:t>…. </a:t>
-            </a:r>
-            <a:r>
-              <a:rPr lang="ko-KR" altLang="en-US" dirty="0" smtClean="0">
-                <a:solidFill>
-                  <a:schemeClr val="bg1"/>
-                </a:solidFill>
-              </a:rPr>
-              <a:t>구름 </a:t>
-            </a:r>
-            <a:r>
-              <a:rPr lang="en-US" altLang="ko-KR" dirty="0" smtClean="0">
-                <a:solidFill>
-                  <a:schemeClr val="bg1"/>
-                </a:solidFill>
-              </a:rPr>
-              <a:t>IDE….</a:t>
-            </a:r>
-          </a:p>
-          <a:p>
-            <a:r>
-              <a:rPr lang="ko-KR" altLang="en-US" dirty="0" smtClean="0">
-                <a:solidFill>
-                  <a:schemeClr val="bg1"/>
-                </a:solidFill>
-              </a:rPr>
-              <a:t>우린 게임인데</a:t>
-            </a:r>
-            <a:endParaRPr lang="en-US" altLang="ko-KR" dirty="0" smtClean="0">
-              <a:solidFill>
-                <a:schemeClr val="bg1"/>
-              </a:solidFill>
-            </a:endParaRPr>
-          </a:p>
-        </p:txBody>
-      </p:sp>
+      </p:pic>
+      <p:pic>
+        <p:nvPicPr>
+          <p:cNvPr id="3" name="그림 2"/>
+          <p:cNvPicPr>
+            <a:picLocks noChangeAspect="1"/>
+          </p:cNvPicPr>
+          <p:nvPr/>
+        </p:nvPicPr>
+        <p:blipFill>
+          <a:blip r:embed="rId4" cstate="print">
+            <a:extLst>
+              <a:ext uri="{28A0092B-C50C-407E-A947-70E740481C1C}">
+                <a14:useLocalDpi xmlns:a14="http://schemas.microsoft.com/office/drawing/2010/main" val="0"/>
+              </a:ext>
+            </a:extLst>
+          </a:blip>
+          <a:stretch>
+            <a:fillRect/>
+          </a:stretch>
+        </p:blipFill>
+        <p:spPr>
+          <a:xfrm>
+            <a:off x="3796960" y="1855237"/>
+            <a:ext cx="2299040" cy="4142063"/>
+          </a:xfrm>
+          <a:prstGeom prst="rect">
+            <a:avLst/>
+          </a:prstGeom>
+        </p:spPr>
+      </p:pic>
+      <p:pic>
+        <p:nvPicPr>
+          <p:cNvPr id="5" name="그림 4"/>
+          <p:cNvPicPr>
+            <a:picLocks noChangeAspect="1"/>
+          </p:cNvPicPr>
+          <p:nvPr/>
+        </p:nvPicPr>
+        <p:blipFill>
+          <a:blip r:embed="rId5">
+            <a:extLst>
+              <a:ext uri="{28A0092B-C50C-407E-A947-70E740481C1C}">
+                <a14:useLocalDpi xmlns:a14="http://schemas.microsoft.com/office/drawing/2010/main" val="0"/>
+              </a:ext>
+            </a:extLst>
+          </a:blip>
+          <a:stretch>
+            <a:fillRect/>
+          </a:stretch>
+        </p:blipFill>
+        <p:spPr>
+          <a:xfrm>
+            <a:off x="3397470" y="1523051"/>
+            <a:ext cx="4594862" cy="4702850"/>
+          </a:xfrm>
+          <a:prstGeom prst="rect">
+            <a:avLst/>
+          </a:prstGeom>
+        </p:spPr>
+      </p:pic>
+      <p:pic>
+        <p:nvPicPr>
+          <p:cNvPr id="6" name="그림 5"/>
+          <p:cNvPicPr>
+            <a:picLocks noChangeAspect="1"/>
+          </p:cNvPicPr>
+          <p:nvPr/>
+        </p:nvPicPr>
+        <p:blipFill>
+          <a:blip r:embed="rId6">
+            <a:extLst>
+              <a:ext uri="{28A0092B-C50C-407E-A947-70E740481C1C}">
+                <a14:useLocalDpi xmlns:a14="http://schemas.microsoft.com/office/drawing/2010/main" val="0"/>
+              </a:ext>
+            </a:extLst>
+          </a:blip>
+          <a:stretch>
+            <a:fillRect/>
+          </a:stretch>
+        </p:blipFill>
+        <p:spPr>
+          <a:xfrm>
+            <a:off x="2128209" y="1523043"/>
+            <a:ext cx="8291182" cy="4675000"/>
+          </a:xfrm>
+          <a:prstGeom prst="rect">
+            <a:avLst/>
+          </a:prstGeom>
+        </p:spPr>
+      </p:pic>
+      <p:pic>
+        <p:nvPicPr>
+          <p:cNvPr id="7" name="그림 6"/>
+          <p:cNvPicPr>
+            <a:picLocks noChangeAspect="1"/>
+          </p:cNvPicPr>
+          <p:nvPr/>
+        </p:nvPicPr>
+        <p:blipFill>
+          <a:blip r:embed="rId7">
+            <a:extLst>
+              <a:ext uri="{28A0092B-C50C-407E-A947-70E740481C1C}">
+                <a14:useLocalDpi xmlns:a14="http://schemas.microsoft.com/office/drawing/2010/main" val="0"/>
+              </a:ext>
+            </a:extLst>
+          </a:blip>
+          <a:stretch>
+            <a:fillRect/>
+          </a:stretch>
+        </p:blipFill>
+        <p:spPr>
+          <a:xfrm>
+            <a:off x="2888854" y="1427625"/>
+            <a:ext cx="6414292" cy="4933194"/>
+          </a:xfrm>
+          <a:prstGeom prst="rect">
+            <a:avLst/>
+          </a:prstGeom>
+        </p:spPr>
+      </p:pic>
     </p:spTree>
     <p:extLst>
       <p:ext uri="{BB962C8B-B14F-4D97-AF65-F5344CB8AC3E}">
-        <p14:creationId xmlns:p14="http://schemas.microsoft.com/office/powerpoint/2010/main" val="4284710833"/>
+        <p14:creationId xmlns:p14="http://schemas.microsoft.com/office/powerpoint/2010/main" val="2167048437"/>
       </p:ext>
     </p:extLst>
   </p:cSld>
@@ -5193,9 +5067,6 @@
                     <p:cTn id="3" fill="hold">
                       <p:stCondLst>
                         <p:cond delay="indefinite"/>
-                        <p:cond evt="onBegin" delay="0">
-                          <p:tn val="2"/>
-                        </p:cond>
                       </p:stCondLst>
                       <p:childTnLst>
                         <p:par>
@@ -5205,7 +5076,7 @@
                             </p:stCondLst>
                             <p:childTnLst>
                               <p:par>
-                                <p:cTn id="5" presetID="2" presetClass="entr" presetSubtype="2" fill="hold" grpId="0" nodeType="withEffect">
+                                <p:cTn id="5" presetID="10" presetClass="entr" presetSubtype="0" fill="hold" nodeType="clickEffect">
                                   <p:stCondLst>
                                     <p:cond delay="0"/>
                                   </p:stCondLst>
@@ -5218,80 +5089,7 @@
                                           </p:stCondLst>
                                         </p:cTn>
                                         <p:tgtEl>
-                                          <p:spTgt spid="22"/>
-                                        </p:tgtEl>
-                                        <p:attrNameLst>
-                                          <p:attrName>style.visibility</p:attrName>
-                                        </p:attrNameLst>
-                                      </p:cBhvr>
-                                      <p:to>
-                                        <p:strVal val="visible"/>
-                                      </p:to>
-                                    </p:set>
-                                    <p:anim calcmode="lin" valueType="num">
-                                      <p:cBhvr additive="base">
-                                        <p:cTn id="7" dur="500" fill="hold"/>
-                                        <p:tgtEl>
-                                          <p:spTgt spid="22"/>
-                                        </p:tgtEl>
-                                        <p:attrNameLst>
-                                          <p:attrName>ppt_x</p:attrName>
-                                        </p:attrNameLst>
-                                      </p:cBhvr>
-                                      <p:tavLst>
-                                        <p:tav tm="0">
-                                          <p:val>
-                                            <p:strVal val="1+#ppt_w/2"/>
-                                          </p:val>
-                                        </p:tav>
-                                        <p:tav tm="100000">
-                                          <p:val>
-                                            <p:strVal val="#ppt_x"/>
-                                          </p:val>
-                                        </p:tav>
-                                      </p:tavLst>
-                                    </p:anim>
-                                    <p:anim calcmode="lin" valueType="num">
-                                      <p:cBhvr additive="base">
-                                        <p:cTn id="8" dur="500" fill="hold"/>
-                                        <p:tgtEl>
-                                          <p:spTgt spid="22"/>
-                                        </p:tgtEl>
-                                        <p:attrNameLst>
-                                          <p:attrName>ppt_y</p:attrName>
-                                        </p:attrNameLst>
-                                      </p:cBhvr>
-                                      <p:tavLst>
-                                        <p:tav tm="0">
-                                          <p:val>
-                                            <p:strVal val="#ppt_y"/>
-                                          </p:val>
-                                        </p:tav>
-                                        <p:tav tm="100000">
-                                          <p:val>
-                                            <p:strVal val="#ppt_y"/>
-                                          </p:val>
-                                        </p:tav>
-                                      </p:tavLst>
-                                    </p:anim>
-                                  </p:childTnLst>
-                                </p:cTn>
-                              </p:par>
-                              <p:par>
-                                <p:cTn id="9" presetID="42" presetClass="entr" presetSubtype="0" fill="hold" grpId="0" nodeType="withEffect">
-                                  <p:stCondLst>
-                                    <p:cond delay="500"/>
-                                  </p:stCondLst>
-                                  <p:childTnLst>
-                                    <p:set>
-                                      <p:cBhvr>
-                                        <p:cTn id="10" dur="1" fill="hold">
-                                          <p:stCondLst>
-                                            <p:cond delay="0"/>
-                                          </p:stCondLst>
-                                        </p:cTn>
-                                        <p:tgtEl>
-                                          <p:spTgt spid="23"/>
+                                          <p:spTgt spid="2"/>
                                         </p:tgtEl>
                                         <p:attrNameLst>
                                           <p:attrName>style.visibility</p:attrName>
@@ -5303,76 +5101,30 @@
                                     </p:set>
                                     <p:animEffect transition="in" filter="fade">
                                       <p:cBhvr>
-                                        <p:cTn id="11" dur="1000"/>
+                                        <p:cTn id="7" dur="500"/>
                                         <p:tgtEl>
-                                          <p:spTgt spid="23"/>
+                                          <p:spTgt spid="2"/>
                                         </p:tgtEl>
                                       </p:cBhvr>
                                     </p:animEffect>
-                                    <p:anim calcmode="lin" valueType="num">
-                                      <p:cBhvr>
-                                        <p:cTn id="12" dur="1000" fill="hold"/>
-                                        <p:tgtEl>
-                                          <p:spTgt spid="23"/>
-                                        </p:tgtEl>
-                                        <p:attrNameLst>
-                                          <p:attrName>ppt_x</p:attrName>
-                                        </p:attrNameLst>
-                                      </p:cBhvr>
-                                      <p:tavLst>
-                                        <p:tav tm="0">
-                                          <p:val>
-                                            <p:strVal val="#ppt_x"/>
-                                          </p:val>
-                                        </p:tav>
-                                        <p:tav tm="100000">
-                                          <p:val>
-                                            <p:strVal val="#ppt_x"/>
-                                          </p:val>
-                                        </p:tav>
-                                      </p:tavLst>
-                                    </p:anim>
-                                    <p:anim calcmode="lin" valueType="num">
-                                      <p:cBhvr>
-                                        <p:cTn id="13" dur="1000" fill="hold"/>
-                                        <p:tgtEl>
-                                          <p:spTgt spid="23"/>
-                                        </p:tgtEl>
-                                        <p:attrNameLst>
-                                          <p:attrName>ppt_y</p:attrName>
-                                        </p:attrNameLst>
-                                      </p:cBhvr>
-                                      <p:tavLst>
-                                        <p:tav tm="0">
-                                          <p:val>
-                                            <p:strVal val="#ppt_y+.1"/>
-                                          </p:val>
-                                        </p:tav>
-                                        <p:tav tm="100000">
-                                          <p:val>
-                                            <p:strVal val="#ppt_y"/>
-                                          </p:val>
-                                        </p:tav>
-                                      </p:tavLst>
-                                    </p:anim>
                                   </p:childTnLst>
                                 </p:cTn>
                               </p:par>
                               <p:par>
-                                <p:cTn id="14" presetID="10" presetClass="entr" presetSubtype="0" fill="hold" grpId="0" nodeType="withEffect">
+                                <p:cTn id="8" presetID="10" presetClass="entr" presetSubtype="0" fill="hold" nodeType="withEffect">
                                   <p:stCondLst>
-                                    <p:cond delay="500"/>
+                                    <p:cond delay="0"/>
                                   </p:stCondLst>
                                   <p:childTnLst>
                                     <p:set>
                                       <p:cBhvr>
-                                        <p:cTn id="15" dur="1" fill="hold">
+                                        <p:cTn id="9" dur="1" fill="hold">
                                           <p:stCondLst>
                                             <p:cond delay="0"/>
                                           </p:stCondLst>
                                         </p:cTn>
                                         <p:tgtEl>
-                                          <p:spTgt spid="11"/>
+                                          <p:spTgt spid="3"/>
                                         </p:tgtEl>
                                         <p:attrNameLst>
                                           <p:attrName>style.visibility</p:attrName>
@@ -5384,12 +5136,311 @@
                                     </p:set>
                                     <p:animEffect transition="in" filter="fade">
                                       <p:cBhvr>
-                                        <p:cTn id="16" dur="500"/>
+                                        <p:cTn id="10" dur="500"/>
                                         <p:tgtEl>
-                                          <p:spTgt spid="11"/>
+                                          <p:spTgt spid="3"/>
                                         </p:tgtEl>
                                       </p:cBhvr>
                                     </p:animEffect>
+                                  </p:childTnLst>
+                                </p:cTn>
+                              </p:par>
+                            </p:childTnLst>
+                          </p:cTn>
+                        </p:par>
+                      </p:childTnLst>
+                    </p:cTn>
+                  </p:par>
+                  <p:par>
+                    <p:cTn id="11" fill="hold">
+                      <p:stCondLst>
+                        <p:cond delay="indefinite"/>
+                      </p:stCondLst>
+                      <p:childTnLst>
+                        <p:par>
+                          <p:cTn id="12" fill="hold">
+                            <p:stCondLst>
+                              <p:cond delay="0"/>
+                            </p:stCondLst>
+                            <p:childTnLst>
+                              <p:par>
+                                <p:cTn id="13" presetID="10" presetClass="exit" presetSubtype="0" fill="hold" nodeType="clickEffect">
+                                  <p:stCondLst>
+                                    <p:cond delay="0"/>
+                                  </p:stCondLst>
+                                  <p:childTnLst>
+                                    <p:animEffect transition="out" filter="fade">
+                                      <p:cBhvr>
+                                        <p:cTn id="14" dur="500"/>
+                                        <p:tgtEl>
+                                          <p:spTgt spid="2"/>
+                                        </p:tgtEl>
+                                      </p:cBhvr>
+                                    </p:animEffect>
+                                    <p:set>
+                                      <p:cBhvr>
+                                        <p:cTn id="15" dur="1" fill="hold">
+                                          <p:stCondLst>
+                                            <p:cond delay="499"/>
+                                          </p:stCondLst>
+                                        </p:cTn>
+                                        <p:tgtEl>
+                                          <p:spTgt spid="2"/>
+                                        </p:tgtEl>
+                                        <p:attrNameLst>
+                                          <p:attrName>style.visibility</p:attrName>
+                                        </p:attrNameLst>
+                                      </p:cBhvr>
+                                      <p:to>
+                                        <p:strVal val="hidden"/>
+                                      </p:to>
+                                    </p:set>
+                                  </p:childTnLst>
+                                </p:cTn>
+                              </p:par>
+                              <p:par>
+                                <p:cTn id="16" presetID="10" presetClass="exit" presetSubtype="0" fill="hold" nodeType="withEffect">
+                                  <p:stCondLst>
+                                    <p:cond delay="0"/>
+                                  </p:stCondLst>
+                                  <p:childTnLst>
+                                    <p:animEffect transition="out" filter="fade">
+                                      <p:cBhvr>
+                                        <p:cTn id="17" dur="500"/>
+                                        <p:tgtEl>
+                                          <p:spTgt spid="3"/>
+                                        </p:tgtEl>
+                                      </p:cBhvr>
+                                    </p:animEffect>
+                                    <p:set>
+                                      <p:cBhvr>
+                                        <p:cTn id="18" dur="1" fill="hold">
+                                          <p:stCondLst>
+                                            <p:cond delay="499"/>
+                                          </p:stCondLst>
+                                        </p:cTn>
+                                        <p:tgtEl>
+                                          <p:spTgt spid="3"/>
+                                        </p:tgtEl>
+                                        <p:attrNameLst>
+                                          <p:attrName>style.visibility</p:attrName>
+                                        </p:attrNameLst>
+                                      </p:cBhvr>
+                                      <p:to>
+                                        <p:strVal val="hidden"/>
+                                      </p:to>
+                                    </p:set>
+                                  </p:childTnLst>
+                                </p:cTn>
+                              </p:par>
+                              <p:par>
+                                <p:cTn id="19" presetID="10" presetClass="entr" presetSubtype="0" fill="hold" nodeType="withEffect">
+                                  <p:stCondLst>
+                                    <p:cond delay="0"/>
+                                  </p:stCondLst>
+                                  <p:childTnLst>
+                                    <p:set>
+                                      <p:cBhvr>
+                                        <p:cTn id="20" dur="1" fill="hold">
+                                          <p:stCondLst>
+                                            <p:cond delay="0"/>
+                                          </p:stCondLst>
+                                        </p:cTn>
+                                        <p:tgtEl>
+                                          <p:spTgt spid="5"/>
+                                        </p:tgtEl>
+                                        <p:attrNameLst>
+                                          <p:attrName>style.visibility</p:attrName>
+                                        </p:attrNameLst>
+                                      </p:cBhvr>
+                                      <p:to>
+                                        <p:strVal val="visible"/>
+                                      </p:to>
+                                    </p:set>
+                                    <p:animEffect transition="in" filter="fade">
+                                      <p:cBhvr>
+                                        <p:cTn id="21" dur="500"/>
+                                        <p:tgtEl>
+                                          <p:spTgt spid="5"/>
+                                        </p:tgtEl>
+                                      </p:cBhvr>
+                                    </p:animEffect>
+                                  </p:childTnLst>
+                                </p:cTn>
+                              </p:par>
+                            </p:childTnLst>
+                          </p:cTn>
+                        </p:par>
+                      </p:childTnLst>
+                    </p:cTn>
+                  </p:par>
+                  <p:par>
+                    <p:cTn id="22" fill="hold">
+                      <p:stCondLst>
+                        <p:cond delay="indefinite"/>
+                      </p:stCondLst>
+                      <p:childTnLst>
+                        <p:par>
+                          <p:cTn id="23" fill="hold">
+                            <p:stCondLst>
+                              <p:cond delay="0"/>
+                            </p:stCondLst>
+                            <p:childTnLst>
+                              <p:par>
+                                <p:cTn id="24" presetID="10" presetClass="exit" presetSubtype="0" fill="hold" nodeType="clickEffect">
+                                  <p:stCondLst>
+                                    <p:cond delay="0"/>
+                                  </p:stCondLst>
+                                  <p:childTnLst>
+                                    <p:animEffect transition="out" filter="fade">
+                                      <p:cBhvr>
+                                        <p:cTn id="25" dur="500"/>
+                                        <p:tgtEl>
+                                          <p:spTgt spid="5"/>
+                                        </p:tgtEl>
+                                      </p:cBhvr>
+                                    </p:animEffect>
+                                    <p:set>
+                                      <p:cBhvr>
+                                        <p:cTn id="26" dur="1" fill="hold">
+                                          <p:stCondLst>
+                                            <p:cond delay="499"/>
+                                          </p:stCondLst>
+                                        </p:cTn>
+                                        <p:tgtEl>
+                                          <p:spTgt spid="5"/>
+                                        </p:tgtEl>
+                                        <p:attrNameLst>
+                                          <p:attrName>style.visibility</p:attrName>
+                                        </p:attrNameLst>
+                                      </p:cBhvr>
+                                      <p:to>
+                                        <p:strVal val="hidden"/>
+                                      </p:to>
+                                    </p:set>
+                                  </p:childTnLst>
+                                </p:cTn>
+                              </p:par>
+                              <p:par>
+                                <p:cTn id="27" presetID="10" presetClass="entr" presetSubtype="0" fill="hold" nodeType="withEffect">
+                                  <p:stCondLst>
+                                    <p:cond delay="0"/>
+                                  </p:stCondLst>
+                                  <p:childTnLst>
+                                    <p:set>
+                                      <p:cBhvr>
+                                        <p:cTn id="28" dur="1" fill="hold">
+                                          <p:stCondLst>
+                                            <p:cond delay="0"/>
+                                          </p:stCondLst>
+                                        </p:cTn>
+                                        <p:tgtEl>
+                                          <p:spTgt spid="6"/>
+                                        </p:tgtEl>
+                                        <p:attrNameLst>
+                                          <p:attrName>style.visibility</p:attrName>
+                                        </p:attrNameLst>
+                                      </p:cBhvr>
+                                      <p:to>
+                                        <p:strVal val="visible"/>
+                                      </p:to>
+                                    </p:set>
+                                    <p:animEffect transition="in" filter="fade">
+                                      <p:cBhvr>
+                                        <p:cTn id="29" dur="500"/>
+                                        <p:tgtEl>
+                                          <p:spTgt spid="6"/>
+                                        </p:tgtEl>
+                                      </p:cBhvr>
+                                    </p:animEffect>
+                                  </p:childTnLst>
+                                </p:cTn>
+                              </p:par>
+                            </p:childTnLst>
+                          </p:cTn>
+                        </p:par>
+                      </p:childTnLst>
+                    </p:cTn>
+                  </p:par>
+                  <p:par>
+                    <p:cTn id="30" fill="hold">
+                      <p:stCondLst>
+                        <p:cond delay="indefinite"/>
+                      </p:stCondLst>
+                      <p:childTnLst>
+                        <p:par>
+                          <p:cTn id="31" fill="hold">
+                            <p:stCondLst>
+                              <p:cond delay="0"/>
+                            </p:stCondLst>
+                            <p:childTnLst>
+                              <p:par>
+                                <p:cTn id="32" presetID="10" presetClass="entr" presetSubtype="0" fill="hold" nodeType="clickEffect">
+                                  <p:stCondLst>
+                                    <p:cond delay="0"/>
+                                  </p:stCondLst>
+                                  <p:childTnLst>
+                                    <p:set>
+                                      <p:cBhvr>
+                                        <p:cTn id="33" dur="1" fill="hold">
+                                          <p:stCondLst>
+                                            <p:cond delay="0"/>
+                                          </p:stCondLst>
+                                        </p:cTn>
+                                        <p:tgtEl>
+                                          <p:spTgt spid="7"/>
+                                        </p:tgtEl>
+                                        <p:attrNameLst>
+                                          <p:attrName>style.visibility</p:attrName>
+                                        </p:attrNameLst>
+                                      </p:cBhvr>
+                                      <p:to>
+                                        <p:strVal val="visible"/>
+                                      </p:to>
+                                    </p:set>
+                                    <p:animEffect transition="in" filter="fade">
+                                      <p:cBhvr>
+                                        <p:cTn id="34" dur="500"/>
+                                        <p:tgtEl>
+                                          <p:spTgt spid="7"/>
+                                        </p:tgtEl>
+                                      </p:cBhvr>
+                                    </p:animEffect>
+                                  </p:childTnLst>
+                                </p:cTn>
+                              </p:par>
+                              <p:par>
+                                <p:cTn id="35" presetID="10" presetClass="exit" presetSubtype="0" fill="hold" nodeType="withEffect">
+                                  <p:stCondLst>
+                                    <p:cond delay="0"/>
+                                  </p:stCondLst>
+                                  <p:childTnLst>
+                                    <p:animEffect transition="out" filter="fade">
+                                      <p:cBhvr>
+                                        <p:cTn id="36" dur="500"/>
+                                        <p:tgtEl>
+                                          <p:spTgt spid="6"/>
+                                        </p:tgtEl>
+                                      </p:cBhvr>
+                                    </p:animEffect>
+                                    <p:set>
+                                      <p:cBhvr>
+                                        <p:cTn id="37" dur="1" fill="hold">
+                                          <p:stCondLst>
+                                            <p:cond delay="499"/>
+                                          </p:stCondLst>
+                                        </p:cTn>
+                                        <p:tgtEl>
+                                          <p:spTgt spid="6"/>
+                                        </p:tgtEl>
+                                        <p:attrNameLst>
+                                          <p:attrName>style.visibility</p:attrName>
+                                        </p:attrNameLst>
+                                      </p:cBhvr>
+                                      <p:to>
+                                        <p:strVal val="hidden"/>
+                                      </p:to>
+                                    </p:set>
                                   </p:childTnLst>
                                 </p:cTn>
                               </p:par>
@@ -5420,11 +5471,6 @@
         </p:cTn>
       </p:par>
     </p:tnLst>
-    <p:bldLst>
-      <p:bldP spid="22" grpId="0" animBg="1"/>
-      <p:bldP spid="23" grpId="0" animBg="1"/>
-      <p:bldP spid="11" grpId="0"/>
-    </p:bldLst>
   </p:timing>
 </p:sld>
 </file>
@@ -5753,100 +5799,6 @@
       </p:grpSp>
       <p:sp>
         <p:nvSpPr>
-          <p:cNvPr id="22" name="직사각형 21"/>
-          <p:cNvSpPr/>
-          <p:nvPr/>
-        </p:nvSpPr>
-        <p:spPr>
-          <a:xfrm>
-            <a:off x="8910608" y="-8817"/>
-            <a:ext cx="3303931" cy="6858000"/>
-          </a:xfrm>
-          <a:prstGeom prst="rect">
-            <a:avLst/>
-          </a:prstGeom>
-          <a:solidFill>
-            <a:schemeClr val="tx2">
-              <a:lumMod val="75000"/>
-            </a:schemeClr>
-          </a:solidFill>
-          <a:ln>
-            <a:noFill/>
-          </a:ln>
-        </p:spPr>
-        <p:style>
-          <a:lnRef idx="2">
-            <a:schemeClr val="accent1">
-              <a:shade val="50000"/>
-            </a:schemeClr>
-          </a:lnRef>
-          <a:fillRef idx="1">
-            <a:schemeClr val="accent1"/>
-          </a:fillRef>
-          <a:effectRef idx="0">
-            <a:schemeClr val="accent1"/>
-          </a:effectRef>
-          <a:fontRef idx="minor">
-            <a:schemeClr val="lt1"/>
-          </a:fontRef>
-        </p:style>
-        <p:txBody>
-          <a:bodyPr rtlCol="0" anchor="ctr"/>
-          <a:lstStyle/>
-          <a:p>
-            <a:pPr algn="ctr"/>
-            <a:endParaRPr lang="ko-KR" altLang="en-US" sz="2200" dirty="0"/>
-          </a:p>
-        </p:txBody>
-      </p:sp>
-      <p:sp>
-        <p:nvSpPr>
-          <p:cNvPr id="23" name="직각 삼각형 22"/>
-          <p:cNvSpPr/>
-          <p:nvPr/>
-        </p:nvSpPr>
-        <p:spPr>
-          <a:xfrm flipH="1">
-            <a:off x="10312768" y="5029200"/>
-            <a:ext cx="1901777" cy="1828800"/>
-          </a:xfrm>
-          <a:prstGeom prst="rtTriangle">
-            <a:avLst/>
-          </a:prstGeom>
-          <a:solidFill>
-            <a:schemeClr val="bg1"/>
-          </a:solidFill>
-          <a:ln>
-            <a:noFill/>
-          </a:ln>
-        </p:spPr>
-        <p:style>
-          <a:lnRef idx="2">
-            <a:schemeClr val="accent1">
-              <a:shade val="50000"/>
-            </a:schemeClr>
-          </a:lnRef>
-          <a:fillRef idx="1">
-            <a:schemeClr val="accent1"/>
-          </a:fillRef>
-          <a:effectRef idx="0">
-            <a:schemeClr val="accent1"/>
-          </a:effectRef>
-          <a:fontRef idx="minor">
-            <a:schemeClr val="lt1"/>
-          </a:fontRef>
-        </p:style>
-        <p:txBody>
-          <a:bodyPr rtlCol="0" anchor="ctr"/>
-          <a:lstStyle/>
-          <a:p>
-            <a:pPr algn="ctr"/>
-            <a:endParaRPr lang="ko-KR" altLang="en-US"/>
-          </a:p>
-        </p:txBody>
-      </p:sp>
-      <p:sp>
-        <p:nvSpPr>
           <p:cNvPr id="4" name="제목 3"/>
           <p:cNvSpPr>
             <a:spLocks noGrp="1"/>
@@ -5871,7 +5823,7 @@
                   <a:schemeClr val="bg1"/>
                 </a:solidFill>
               </a:rPr>
-              <a:t>이번 달 한 것</a:t>
+              <a:t>게임 플레이</a:t>
             </a:r>
             <a:endParaRPr lang="ko-KR" altLang="en-US" sz="3200" dirty="0">
               <a:solidFill>
@@ -5889,8 +5841,8 @@
         </p:nvSpPr>
         <p:spPr>
           <a:xfrm>
-            <a:off x="3255469" y="2820018"/>
-            <a:ext cx="2755687" cy="1477328"/>
+            <a:off x="4715969" y="3373864"/>
+            <a:ext cx="2891331" cy="830997"/>
           </a:xfrm>
           <a:prstGeom prst="rect">
             <a:avLst/>
@@ -5904,106 +5856,14 @@
           <a:lstStyle/>
           <a:p>
             <a:r>
-              <a:rPr lang="ko-KR" altLang="en-US" dirty="0" smtClean="0">
+              <a:rPr lang="ko-KR" altLang="en-US" sz="4800" dirty="0" smtClean="0">
                 <a:solidFill>
                   <a:schemeClr val="bg1"/>
                 </a:solidFill>
               </a:rPr>
-              <a:t>게임 </a:t>
+              <a:t>게임 시연</a:t>
             </a:r>
-            <a:r>
-              <a:rPr lang="ko-KR" altLang="en-US" dirty="0" err="1" smtClean="0">
-                <a:solidFill>
-                  <a:schemeClr val="bg1"/>
-                </a:solidFill>
-              </a:rPr>
-              <a:t>케릭터</a:t>
-            </a:r>
-            <a:r>
-              <a:rPr lang="ko-KR" altLang="en-US" dirty="0" smtClean="0">
-                <a:solidFill>
-                  <a:schemeClr val="bg1"/>
-                </a:solidFill>
-              </a:rPr>
-              <a:t> 설정 완료</a:t>
-            </a:r>
-            <a:endParaRPr lang="en-US" altLang="ko-KR" dirty="0" smtClean="0">
-              <a:solidFill>
-                <a:schemeClr val="bg1"/>
-              </a:solidFill>
-            </a:endParaRPr>
-          </a:p>
-          <a:p>
-            <a:r>
-              <a:rPr lang="ko-KR" altLang="en-US" dirty="0" smtClean="0">
-                <a:solidFill>
-                  <a:schemeClr val="bg1"/>
-                </a:solidFill>
-              </a:rPr>
-              <a:t>시나리오 작성함</a:t>
-            </a:r>
-            <a:endParaRPr lang="en-US" altLang="ko-KR" dirty="0" smtClean="0">
-              <a:solidFill>
-                <a:schemeClr val="bg1"/>
-              </a:solidFill>
-            </a:endParaRPr>
-          </a:p>
-          <a:p>
-            <a:r>
-              <a:rPr lang="ko-KR" altLang="en-US" dirty="0" smtClean="0">
-                <a:solidFill>
-                  <a:schemeClr val="bg1"/>
-                </a:solidFill>
-              </a:rPr>
-              <a:t>게임 시스템 </a:t>
-            </a:r>
-            <a:r>
-              <a:rPr lang="ko-KR" altLang="en-US" dirty="0" smtClean="0">
-                <a:solidFill>
-                  <a:schemeClr val="bg1"/>
-                </a:solidFill>
-              </a:rPr>
-              <a:t>기획 </a:t>
-            </a:r>
-            <a:r>
-              <a:rPr lang="ko-KR" altLang="en-US" dirty="0" smtClean="0">
-                <a:solidFill>
-                  <a:schemeClr val="bg1"/>
-                </a:solidFill>
-              </a:rPr>
-              <a:t>완료</a:t>
-            </a:r>
-            <a:endParaRPr lang="en-US" altLang="ko-KR" dirty="0" smtClean="0">
-              <a:solidFill>
-                <a:schemeClr val="bg1"/>
-              </a:solidFill>
-            </a:endParaRPr>
-          </a:p>
-          <a:p>
-            <a:r>
-              <a:rPr lang="ko-KR" altLang="en-US" dirty="0" smtClean="0">
-                <a:solidFill>
-                  <a:schemeClr val="bg1"/>
-                </a:solidFill>
-              </a:rPr>
-              <a:t>게임 코딩</a:t>
-            </a:r>
-            <a:endParaRPr lang="en-US" altLang="ko-KR" dirty="0" smtClean="0">
-              <a:solidFill>
-                <a:schemeClr val="bg1"/>
-              </a:solidFill>
-            </a:endParaRPr>
-          </a:p>
-          <a:p>
-            <a:r>
-              <a:rPr lang="ko-KR" altLang="en-US" dirty="0" err="1" smtClean="0">
-                <a:solidFill>
-                  <a:schemeClr val="bg1"/>
-                </a:solidFill>
-              </a:rPr>
-              <a:t>테스트중</a:t>
-            </a:r>
-            <a:endParaRPr lang="en-US" altLang="ko-KR" dirty="0">
+            <a:endParaRPr lang="en-US" altLang="ko-KR" sz="4800" dirty="0" smtClean="0">
               <a:solidFill>
                 <a:schemeClr val="bg1"/>
               </a:solidFill>
@@ -6014,7 +5874,7 @@
     </p:spTree>
     <p:extLst>
       <p:ext uri="{BB962C8B-B14F-4D97-AF65-F5344CB8AC3E}">
-        <p14:creationId xmlns:p14="http://schemas.microsoft.com/office/powerpoint/2010/main" val="2167048437"/>
+        <p14:creationId xmlns:p14="http://schemas.microsoft.com/office/powerpoint/2010/main" val="2272494223"/>
       </p:ext>
     </p:extLst>
   </p:cSld>
@@ -6045,168 +5905,14 @@
                             </p:stCondLst>
                             <p:childTnLst>
                               <p:par>
-                                <p:cTn id="5" presetID="2" presetClass="entr" presetSubtype="2" fill="hold" grpId="0" nodeType="withEffect">
-                                  <p:stCondLst>
-                                    <p:cond delay="0"/>
-                                  </p:stCondLst>
-                                  <p:childTnLst>
-                                    <p:set>
-                                      <p:cBhvr>
-                                        <p:cTn id="6" dur="1" fill="hold">
-                                          <p:stCondLst>
-                                            <p:cond delay="0"/>
-                                          </p:stCondLst>
-                                        </p:cTn>
-                                        <p:tgtEl>
-                                          <p:spTgt spid="22"/>
-                                        </p:tgtEl>
-                                        <p:attrNameLst>
-                                          <p:attrName>style.visibility</p:attrName>
-                                        </p:attrNameLst>
-                                      </p:cBhvr>
-                                      <p:to>
-                                        <p:strVal val="visible"/>
-                                      </p:to>
-                                    </p:set>
-                                    <p:anim calcmode="lin" valueType="num">
-                                      <p:cBhvr additive="base">
-                                        <p:cTn id="7" dur="500" fill="hold"/>
-                                        <p:tgtEl>
-                                          <p:spTgt spid="22"/>
-                                        </p:tgtEl>
-                                        <p:attrNameLst>
-                                          <p:attrName>ppt_x</p:attrName>
-                                        </p:attrNameLst>
-                                      </p:cBhvr>
-                                      <p:tavLst>
-                                        <p:tav tm="0">
-                                          <p:val>
-                                            <p:strVal val="1+#ppt_w/2"/>
-                                          </p:val>
-                                        </p:tav>
-                                        <p:tav tm="100000">
-                                          <p:val>
-                                            <p:strVal val="#ppt_x"/>
-                                          </p:val>
-                                        </p:tav>
-                                      </p:tavLst>
-                                    </p:anim>
-                                    <p:anim calcmode="lin" valueType="num">
-                                      <p:cBhvr additive="base">
-                                        <p:cTn id="8" dur="500" fill="hold"/>
-                                        <p:tgtEl>
-                                          <p:spTgt spid="22"/>
-                                        </p:tgtEl>
-                                        <p:attrNameLst>
-                                          <p:attrName>ppt_y</p:attrName>
-                                        </p:attrNameLst>
-                                      </p:cBhvr>
-                                      <p:tavLst>
-                                        <p:tav tm="0">
-                                          <p:val>
-                                            <p:strVal val="#ppt_y"/>
-                                          </p:val>
-                                        </p:tav>
-                                        <p:tav tm="100000">
-                                          <p:val>
-                                            <p:strVal val="#ppt_y"/>
-                                          </p:val>
-                                        </p:tav>
-                                      </p:tavLst>
-                                    </p:anim>
-                                  </p:childTnLst>
-                                </p:cTn>
-                              </p:par>
-                              <p:par>
-                                <p:cTn id="9" presetID="42" presetClass="entr" presetSubtype="0" fill="hold" grpId="0" nodeType="withEffect">
+                                <p:cTn id="5" presetID="10" presetClass="entr" presetSubtype="0" fill="hold" grpId="0" nodeType="withEffect">
                                   <p:stCondLst>
                                     <p:cond delay="500"/>
                                   </p:stCondLst>
                                   <p:childTnLst>
                                     <p:set>
                                       <p:cBhvr>
-                                        <p:cTn id="10" dur="1" fill="hold">
-                                          <p:stCondLst>
-                                            <p:cond delay="0"/>
-                                          </p:stCondLst>
-                                        </p:cTn>
-                                        <p:tgtEl>
-                                          <p:spTgt spid="23"/>
-                                        </p:tgtEl>
-                                        <p:attrNameLst>
-                                          <p:attrName>style.visibility</p:attrName>
-                                        </p:attrNameLst>
-                                      </p:cBhvr>
-                                      <p:to>
-                                        <p:strVal val="visible"/>
-                                      </p:to>
-                                    </p:set>
-                                    <p:animEffect transition="in" filter="fade">
-                                      <p:cBhvr>
-                                        <p:cTn id="11" dur="1000"/>
-                                        <p:tgtEl>
-                                          <p:spTgt spid="23"/>
-                                        </p:tgtEl>
-                                      </p:cBhvr>
-                                    </p:animEffect>
-                                    <p:anim calcmode="lin" valueType="num">
-                                      <p:cBhvr>
-                                        <p:cTn id="12" dur="1000" fill="hold"/>
-                                        <p:tgtEl>
-                                          <p:spTgt spid="23"/>
-                                        </p:tgtEl>
-                                        <p:attrNameLst>
-                                          <p:attrName>ppt_x</p:attrName>
-                                        </p:attrNameLst>
-                                      </p:cBhvr>
-                                      <p:tavLst>
-                                        <p:tav tm="0">
-                                          <p:val>
-                                            <p:strVal val="#ppt_x"/>
-                                          </p:val>
-                                        </p:tav>
-                                        <p:tav tm="100000">
-                                          <p:val>
-                                            <p:strVal val="#ppt_x"/>
-                                          </p:val>
-                                        </p:tav>
-                                      </p:tavLst>
-                                    </p:anim>
-                                    <p:anim calcmode="lin" valueType="num">
-                                      <p:cBhvr>
-                                        <p:cTn id="13" dur="1000" fill="hold"/>
-                                        <p:tgtEl>
-                                          <p:spTgt spid="23"/>
-                                        </p:tgtEl>
-                                        <p:attrNameLst>
-                                          <p:attrName>ppt_y</p:attrName>
-                                        </p:attrNameLst>
-                                      </p:cBhvr>
-                                      <p:tavLst>
-                                        <p:tav tm="0">
-                                          <p:val>
-                                            <p:strVal val="#ppt_y+.1"/>
-                                          </p:val>
-                                        </p:tav>
-                                        <p:tav tm="100000">
-                                          <p:val>
-                                            <p:strVal val="#ppt_y"/>
-                                          </p:val>
-                                        </p:tav>
-                                      </p:tavLst>
-                                    </p:anim>
-                                  </p:childTnLst>
-                                </p:cTn>
-                              </p:par>
-                              <p:par>
-                                <p:cTn id="14" presetID="10" presetClass="entr" presetSubtype="0" fill="hold" grpId="0" nodeType="withEffect">
-                                  <p:stCondLst>
-                                    <p:cond delay="500"/>
-                                  </p:stCondLst>
-                                  <p:childTnLst>
-                                    <p:set>
-                                      <p:cBhvr>
-                                        <p:cTn id="15" dur="1" fill="hold">
+                                        <p:cTn id="6" dur="1" fill="hold">
                                           <p:stCondLst>
                                             <p:cond delay="0"/>
                                           </p:stCondLst>
@@ -6224,7 +5930,7 @@
                                     </p:set>
                                     <p:animEffect transition="in" filter="fade">
                                       <p:cBhvr>
-                                        <p:cTn id="16" dur="500"/>
+                                        <p:cTn id="7" dur="500"/>
                                         <p:tgtEl>
                                           <p:spTgt spid="11"/>
                                         </p:tgtEl>
@@ -6261,8 +5967,6 @@
       </p:par>
     </p:tnLst>
     <p:bldLst>
-      <p:bldP spid="22" grpId="0" animBg="1"/>
-      <p:bldP spid="23" grpId="0" animBg="1"/>
       <p:bldP spid="11" grpId="0"/>
     </p:bldLst>
   </p:timing>
@@ -6593,100 +6297,6 @@
       </p:grpSp>
       <p:sp>
         <p:nvSpPr>
-          <p:cNvPr id="22" name="직사각형 21"/>
-          <p:cNvSpPr/>
-          <p:nvPr/>
-        </p:nvSpPr>
-        <p:spPr>
-          <a:xfrm>
-            <a:off x="8910608" y="-8817"/>
-            <a:ext cx="3303931" cy="6858000"/>
-          </a:xfrm>
-          <a:prstGeom prst="rect">
-            <a:avLst/>
-          </a:prstGeom>
-          <a:solidFill>
-            <a:schemeClr val="tx2">
-              <a:lumMod val="75000"/>
-            </a:schemeClr>
-          </a:solidFill>
-          <a:ln>
-            <a:noFill/>
-          </a:ln>
-        </p:spPr>
-        <p:style>
-          <a:lnRef idx="2">
-            <a:schemeClr val="accent1">
-              <a:shade val="50000"/>
-            </a:schemeClr>
-          </a:lnRef>
-          <a:fillRef idx="1">
-            <a:schemeClr val="accent1"/>
-          </a:fillRef>
-          <a:effectRef idx="0">
-            <a:schemeClr val="accent1"/>
-          </a:effectRef>
-          <a:fontRef idx="minor">
-            <a:schemeClr val="lt1"/>
-          </a:fontRef>
-        </p:style>
-        <p:txBody>
-          <a:bodyPr rtlCol="0" anchor="ctr"/>
-          <a:lstStyle/>
-          <a:p>
-            <a:pPr algn="ctr"/>
-            <a:endParaRPr lang="ko-KR" altLang="en-US" sz="2200" dirty="0"/>
-          </a:p>
-        </p:txBody>
-      </p:sp>
-      <p:sp>
-        <p:nvSpPr>
-          <p:cNvPr id="23" name="직각 삼각형 22"/>
-          <p:cNvSpPr/>
-          <p:nvPr/>
-        </p:nvSpPr>
-        <p:spPr>
-          <a:xfrm flipH="1">
-            <a:off x="10312768" y="5029200"/>
-            <a:ext cx="1901777" cy="1828800"/>
-          </a:xfrm>
-          <a:prstGeom prst="rtTriangle">
-            <a:avLst/>
-          </a:prstGeom>
-          <a:solidFill>
-            <a:schemeClr val="bg1"/>
-          </a:solidFill>
-          <a:ln>
-            <a:noFill/>
-          </a:ln>
-        </p:spPr>
-        <p:style>
-          <a:lnRef idx="2">
-            <a:schemeClr val="accent1">
-              <a:shade val="50000"/>
-            </a:schemeClr>
-          </a:lnRef>
-          <a:fillRef idx="1">
-            <a:schemeClr val="accent1"/>
-          </a:fillRef>
-          <a:effectRef idx="0">
-            <a:schemeClr val="accent1"/>
-          </a:effectRef>
-          <a:fontRef idx="minor">
-            <a:schemeClr val="lt1"/>
-          </a:fontRef>
-        </p:style>
-        <p:txBody>
-          <a:bodyPr rtlCol="0" anchor="ctr"/>
-          <a:lstStyle/>
-          <a:p>
-            <a:pPr algn="ctr"/>
-            <a:endParaRPr lang="ko-KR" altLang="en-US"/>
-          </a:p>
-        </p:txBody>
-      </p:sp>
-      <p:sp>
-        <p:nvSpPr>
           <p:cNvPr id="4" name="제목 3"/>
           <p:cNvSpPr>
             <a:spLocks noGrp="1"/>
@@ -6711,7 +6321,7 @@
                   <a:schemeClr val="bg1"/>
                 </a:solidFill>
               </a:rPr>
-              <a:t>게임 플레이</a:t>
+              <a:t>프로젝트 진행도</a:t>
             </a:r>
             <a:endParaRPr lang="ko-KR" altLang="en-US" sz="3200" dirty="0">
               <a:solidFill>
@@ -6729,8 +6339,8 @@
         </p:nvSpPr>
         <p:spPr>
           <a:xfrm>
-            <a:off x="3255469" y="2986634"/>
-            <a:ext cx="2755687" cy="923330"/>
+            <a:off x="3255469" y="2530306"/>
+            <a:ext cx="3894268" cy="2031325"/>
           </a:xfrm>
           <a:prstGeom prst="rect">
             <a:avLst/>
@@ -6749,7 +6359,7 @@
                   <a:schemeClr val="bg1"/>
                 </a:solidFill>
               </a:rPr>
-              <a:t>게임은 역시 시연이지</a:t>
+              <a:t>우리 프로젝트는 전체에서 이정도 진행되었다</a:t>
             </a:r>
             <a:endParaRPr lang="en-US" altLang="ko-KR" dirty="0" smtClean="0">
               <a:solidFill>
@@ -6764,15 +6374,22 @@
                   <a:schemeClr val="bg1"/>
                 </a:solidFill>
               </a:rPr>
-              <a:t>처음 </a:t>
+              <a:t>전체는 </a:t>
             </a:r>
+            <a:endParaRPr lang="en-US" altLang="ko-KR" dirty="0" smtClean="0">
+              <a:solidFill>
+                <a:schemeClr val="bg1"/>
+              </a:solidFill>
+            </a:endParaRPr>
+          </a:p>
+          <a:p>
             <a:r>
-              <a:rPr lang="ko-KR" altLang="en-US" dirty="0" err="1" smtClean="0">
+              <a:rPr lang="en-US" altLang="ko-KR" dirty="0" smtClean="0">
                 <a:solidFill>
                   <a:schemeClr val="bg1"/>
                 </a:solidFill>
               </a:rPr>
-              <a:t>부터</a:t>
+              <a:t>1) </a:t>
             </a:r>
             <a:r>
               <a:rPr lang="ko-KR" altLang="en-US" dirty="0" smtClean="0">
@@ -6780,15 +6397,7 @@
                   <a:schemeClr val="bg1"/>
                 </a:solidFill>
               </a:rPr>
-              <a:t> </a:t>
-            </a:r>
-            <a:r>
-              <a:rPr lang="ko-KR" altLang="en-US" dirty="0" err="1" smtClean="0">
-                <a:solidFill>
-                  <a:schemeClr val="bg1"/>
-                </a:solidFill>
-              </a:rPr>
-              <a:t>컨테이너씬까지</a:t>
+              <a:t>게임 </a:t>
             </a:r>
             <a:r>
               <a:rPr lang="ko-KR" altLang="en-US" dirty="0" smtClean="0">
@@ -6796,7 +6405,7 @@
                   <a:schemeClr val="bg1"/>
                 </a:solidFill>
               </a:rPr>
-              <a:t> 시연</a:t>
+              <a:t>제작</a:t>
             </a:r>
             <a:endParaRPr lang="en-US" altLang="ko-KR" dirty="0" smtClean="0">
               <a:solidFill>
@@ -6804,12 +6413,654 @@
               </a:solidFill>
             </a:endParaRPr>
           </a:p>
+          <a:p>
+            <a:r>
+              <a:rPr lang="en-US" altLang="ko-KR" dirty="0" smtClean="0">
+                <a:solidFill>
+                  <a:schemeClr val="bg1"/>
+                </a:solidFill>
+              </a:rPr>
+              <a:t>2) </a:t>
+            </a:r>
+            <a:r>
+              <a:rPr lang="ko-KR" altLang="en-US" dirty="0" smtClean="0">
+                <a:solidFill>
+                  <a:schemeClr val="bg1"/>
+                </a:solidFill>
+              </a:rPr>
+              <a:t>홍보</a:t>
+            </a:r>
+            <a:endParaRPr lang="en-US" altLang="ko-KR" dirty="0" smtClean="0">
+              <a:solidFill>
+                <a:schemeClr val="bg1"/>
+              </a:solidFill>
+            </a:endParaRPr>
+          </a:p>
+          <a:p>
+            <a:r>
+              <a:rPr lang="en-US" altLang="ko-KR" dirty="0" smtClean="0">
+                <a:solidFill>
+                  <a:schemeClr val="bg1"/>
+                </a:solidFill>
+              </a:rPr>
+              <a:t>3) </a:t>
+            </a:r>
+            <a:r>
+              <a:rPr lang="ko-KR" altLang="en-US" dirty="0" smtClean="0">
+                <a:solidFill>
+                  <a:schemeClr val="bg1"/>
+                </a:solidFill>
+              </a:rPr>
+              <a:t>출시이고</a:t>
+            </a:r>
+            <a:endParaRPr lang="en-US" altLang="ko-KR" dirty="0" smtClean="0">
+              <a:solidFill>
+                <a:schemeClr val="bg1"/>
+              </a:solidFill>
+            </a:endParaRPr>
+          </a:p>
+          <a:p>
+            <a:r>
+              <a:rPr lang="ko-KR" altLang="en-US" dirty="0" smtClean="0">
+                <a:solidFill>
+                  <a:schemeClr val="bg1"/>
+                </a:solidFill>
+              </a:rPr>
+              <a:t>지금은 게임 </a:t>
+            </a:r>
+            <a:r>
+              <a:rPr lang="ko-KR" altLang="en-US" dirty="0" smtClean="0">
+                <a:solidFill>
+                  <a:schemeClr val="bg1"/>
+                </a:solidFill>
+              </a:rPr>
+              <a:t>제작 마무리단계이다</a:t>
+            </a:r>
+            <a:endParaRPr lang="en-US" altLang="ko-KR" dirty="0">
+              <a:solidFill>
+                <a:schemeClr val="bg1"/>
+              </a:solidFill>
+            </a:endParaRPr>
+          </a:p>
         </p:txBody>
       </p:sp>
+      <p:grpSp>
+        <p:nvGrpSpPr>
+          <p:cNvPr id="5" name="그룹 4"/>
+          <p:cNvGrpSpPr/>
+          <p:nvPr/>
+        </p:nvGrpSpPr>
+        <p:grpSpPr>
+          <a:xfrm>
+            <a:off x="2912245" y="3684592"/>
+            <a:ext cx="8128000" cy="5418666"/>
+            <a:chOff x="778645" y="992192"/>
+            <a:chExt cx="8128000" cy="5418666"/>
+          </a:xfrm>
+        </p:grpSpPr>
+        <p:sp>
+          <p:nvSpPr>
+            <p:cNvPr id="6" name="자유형 5"/>
+            <p:cNvSpPr/>
+            <p:nvPr/>
+          </p:nvSpPr>
+          <p:spPr>
+            <a:xfrm>
+              <a:off x="778645" y="992192"/>
+              <a:ext cx="8128000" cy="1693333"/>
+            </a:xfrm>
+            <a:custGeom>
+              <a:avLst/>
+              <a:gdLst>
+                <a:gd name="connsiteX0" fmla="*/ 0 w 8128000"/>
+                <a:gd name="connsiteY0" fmla="*/ 169333 h 1693333"/>
+                <a:gd name="connsiteX1" fmla="*/ 169333 w 8128000"/>
+                <a:gd name="connsiteY1" fmla="*/ 0 h 1693333"/>
+                <a:gd name="connsiteX2" fmla="*/ 7958667 w 8128000"/>
+                <a:gd name="connsiteY2" fmla="*/ 0 h 1693333"/>
+                <a:gd name="connsiteX3" fmla="*/ 8128000 w 8128000"/>
+                <a:gd name="connsiteY3" fmla="*/ 169333 h 1693333"/>
+                <a:gd name="connsiteX4" fmla="*/ 8128000 w 8128000"/>
+                <a:gd name="connsiteY4" fmla="*/ 1524000 h 1693333"/>
+                <a:gd name="connsiteX5" fmla="*/ 7958667 w 8128000"/>
+                <a:gd name="connsiteY5" fmla="*/ 1693333 h 1693333"/>
+                <a:gd name="connsiteX6" fmla="*/ 169333 w 8128000"/>
+                <a:gd name="connsiteY6" fmla="*/ 1693333 h 1693333"/>
+                <a:gd name="connsiteX7" fmla="*/ 0 w 8128000"/>
+                <a:gd name="connsiteY7" fmla="*/ 1524000 h 1693333"/>
+                <a:gd name="connsiteX8" fmla="*/ 0 w 8128000"/>
+                <a:gd name="connsiteY8" fmla="*/ 169333 h 1693333"/>
+              </a:gdLst>
+              <a:ahLst/>
+              <a:cxnLst>
+                <a:cxn ang="0">
+                  <a:pos x="connsiteX0" y="connsiteY0"/>
+                </a:cxn>
+                <a:cxn ang="0">
+                  <a:pos x="connsiteX1" y="connsiteY1"/>
+                </a:cxn>
+                <a:cxn ang="0">
+                  <a:pos x="connsiteX2" y="connsiteY2"/>
+                </a:cxn>
+                <a:cxn ang="0">
+                  <a:pos x="connsiteX3" y="connsiteY3"/>
+                </a:cxn>
+                <a:cxn ang="0">
+                  <a:pos x="connsiteX4" y="connsiteY4"/>
+                </a:cxn>
+                <a:cxn ang="0">
+                  <a:pos x="connsiteX5" y="connsiteY5"/>
+                </a:cxn>
+                <a:cxn ang="0">
+                  <a:pos x="connsiteX6" y="connsiteY6"/>
+                </a:cxn>
+                <a:cxn ang="0">
+                  <a:pos x="connsiteX7" y="connsiteY7"/>
+                </a:cxn>
+                <a:cxn ang="0">
+                  <a:pos x="connsiteX8" y="connsiteY8"/>
+                </a:cxn>
+              </a:cxnLst>
+              <a:rect l="l" t="t" r="r" b="b"/>
+              <a:pathLst>
+                <a:path w="8128000" h="1693333">
+                  <a:moveTo>
+                    <a:pt x="0" y="169333"/>
+                  </a:moveTo>
+                  <a:cubicBezTo>
+                    <a:pt x="0" y="75813"/>
+                    <a:pt x="75813" y="0"/>
+                    <a:pt x="169333" y="0"/>
+                  </a:cubicBezTo>
+                  <a:lnTo>
+                    <a:pt x="7958667" y="0"/>
+                  </a:lnTo>
+                  <a:cubicBezTo>
+                    <a:pt x="8052187" y="0"/>
+                    <a:pt x="8128000" y="75813"/>
+                    <a:pt x="8128000" y="169333"/>
+                  </a:cubicBezTo>
+                  <a:lnTo>
+                    <a:pt x="8128000" y="1524000"/>
+                  </a:lnTo>
+                  <a:cubicBezTo>
+                    <a:pt x="8128000" y="1617520"/>
+                    <a:pt x="8052187" y="1693333"/>
+                    <a:pt x="7958667" y="1693333"/>
+                  </a:cubicBezTo>
+                  <a:lnTo>
+                    <a:pt x="169333" y="1693333"/>
+                  </a:lnTo>
+                  <a:cubicBezTo>
+                    <a:pt x="75813" y="1693333"/>
+                    <a:pt x="0" y="1617520"/>
+                    <a:pt x="0" y="1524000"/>
+                  </a:cubicBezTo>
+                  <a:lnTo>
+                    <a:pt x="0" y="169333"/>
+                  </a:lnTo>
+                  <a:close/>
+                </a:path>
+              </a:pathLst>
+            </a:custGeom>
+          </p:spPr>
+          <p:style>
+            <a:lnRef idx="2">
+              <a:schemeClr val="lt1">
+                <a:hueOff val="0"/>
+                <a:satOff val="0"/>
+                <a:lumOff val="0"/>
+                <a:alphaOff val="0"/>
+              </a:schemeClr>
+            </a:lnRef>
+            <a:fillRef idx="1">
+              <a:schemeClr val="accent1">
+                <a:hueOff val="0"/>
+                <a:satOff val="0"/>
+                <a:lumOff val="0"/>
+                <a:alphaOff val="0"/>
+              </a:schemeClr>
+            </a:fillRef>
+            <a:effectRef idx="0">
+              <a:schemeClr val="accent1">
+                <a:hueOff val="0"/>
+                <a:satOff val="0"/>
+                <a:lumOff val="0"/>
+                <a:alphaOff val="0"/>
+              </a:schemeClr>
+            </a:effectRef>
+            <a:fontRef idx="minor">
+              <a:schemeClr val="lt1"/>
+            </a:fontRef>
+          </p:style>
+          <p:txBody>
+            <a:bodyPr spcFirstLastPara="0" vert="horz" wrap="square" lIns="1886373" tIns="91440" rIns="91441" bIns="91440" numCol="1" spcCol="1270" anchor="t" anchorCtr="0">
+              <a:noAutofit/>
+            </a:bodyPr>
+            <a:lstStyle/>
+            <a:p>
+              <a:pPr lvl="0" algn="l" defTabSz="1066800" latinLnBrk="1">
+                <a:lnSpc>
+                  <a:spcPct val="90000"/>
+                </a:lnSpc>
+                <a:spcBef>
+                  <a:spcPct val="0"/>
+                </a:spcBef>
+                <a:spcAft>
+                  <a:spcPct val="35000"/>
+                </a:spcAft>
+              </a:pPr>
+              <a:endParaRPr lang="ko-KR" altLang="en-US" sz="2400" kern="1200"/>
+            </a:p>
+            <a:p>
+              <a:pPr marL="171450" lvl="1" indent="-171450" algn="l" defTabSz="844550" latinLnBrk="1">
+                <a:lnSpc>
+                  <a:spcPct val="90000"/>
+                </a:lnSpc>
+                <a:spcBef>
+                  <a:spcPct val="0"/>
+                </a:spcBef>
+                <a:spcAft>
+                  <a:spcPct val="15000"/>
+                </a:spcAft>
+                <a:buChar char="••"/>
+              </a:pPr>
+              <a:endParaRPr lang="ko-KR" altLang="en-US" sz="1900" kern="1200" dirty="0"/>
+            </a:p>
+            <a:p>
+              <a:pPr marL="171450" lvl="1" indent="-171450" algn="l" defTabSz="844550" latinLnBrk="1">
+                <a:lnSpc>
+                  <a:spcPct val="90000"/>
+                </a:lnSpc>
+                <a:spcBef>
+                  <a:spcPct val="0"/>
+                </a:spcBef>
+                <a:spcAft>
+                  <a:spcPct val="15000"/>
+                </a:spcAft>
+                <a:buChar char="••"/>
+              </a:pPr>
+              <a:endParaRPr lang="ko-KR" altLang="en-US" sz="1900" kern="1200"/>
+            </a:p>
+          </p:txBody>
+        </p:sp>
+        <p:sp>
+          <p:nvSpPr>
+            <p:cNvPr id="8" name="자유형 7"/>
+            <p:cNvSpPr/>
+            <p:nvPr/>
+          </p:nvSpPr>
+          <p:spPr>
+            <a:xfrm>
+              <a:off x="778645" y="2854858"/>
+              <a:ext cx="8128000" cy="1693333"/>
+            </a:xfrm>
+            <a:custGeom>
+              <a:avLst/>
+              <a:gdLst>
+                <a:gd name="connsiteX0" fmla="*/ 0 w 8128000"/>
+                <a:gd name="connsiteY0" fmla="*/ 169333 h 1693333"/>
+                <a:gd name="connsiteX1" fmla="*/ 169333 w 8128000"/>
+                <a:gd name="connsiteY1" fmla="*/ 0 h 1693333"/>
+                <a:gd name="connsiteX2" fmla="*/ 7958667 w 8128000"/>
+                <a:gd name="connsiteY2" fmla="*/ 0 h 1693333"/>
+                <a:gd name="connsiteX3" fmla="*/ 8128000 w 8128000"/>
+                <a:gd name="connsiteY3" fmla="*/ 169333 h 1693333"/>
+                <a:gd name="connsiteX4" fmla="*/ 8128000 w 8128000"/>
+                <a:gd name="connsiteY4" fmla="*/ 1524000 h 1693333"/>
+                <a:gd name="connsiteX5" fmla="*/ 7958667 w 8128000"/>
+                <a:gd name="connsiteY5" fmla="*/ 1693333 h 1693333"/>
+                <a:gd name="connsiteX6" fmla="*/ 169333 w 8128000"/>
+                <a:gd name="connsiteY6" fmla="*/ 1693333 h 1693333"/>
+                <a:gd name="connsiteX7" fmla="*/ 0 w 8128000"/>
+                <a:gd name="connsiteY7" fmla="*/ 1524000 h 1693333"/>
+                <a:gd name="connsiteX8" fmla="*/ 0 w 8128000"/>
+                <a:gd name="connsiteY8" fmla="*/ 169333 h 1693333"/>
+              </a:gdLst>
+              <a:ahLst/>
+              <a:cxnLst>
+                <a:cxn ang="0">
+                  <a:pos x="connsiteX0" y="connsiteY0"/>
+                </a:cxn>
+                <a:cxn ang="0">
+                  <a:pos x="connsiteX1" y="connsiteY1"/>
+                </a:cxn>
+                <a:cxn ang="0">
+                  <a:pos x="connsiteX2" y="connsiteY2"/>
+                </a:cxn>
+                <a:cxn ang="0">
+                  <a:pos x="connsiteX3" y="connsiteY3"/>
+                </a:cxn>
+                <a:cxn ang="0">
+                  <a:pos x="connsiteX4" y="connsiteY4"/>
+                </a:cxn>
+                <a:cxn ang="0">
+                  <a:pos x="connsiteX5" y="connsiteY5"/>
+                </a:cxn>
+                <a:cxn ang="0">
+                  <a:pos x="connsiteX6" y="connsiteY6"/>
+                </a:cxn>
+                <a:cxn ang="0">
+                  <a:pos x="connsiteX7" y="connsiteY7"/>
+                </a:cxn>
+                <a:cxn ang="0">
+                  <a:pos x="connsiteX8" y="connsiteY8"/>
+                </a:cxn>
+              </a:cxnLst>
+              <a:rect l="l" t="t" r="r" b="b"/>
+              <a:pathLst>
+                <a:path w="8128000" h="1693333">
+                  <a:moveTo>
+                    <a:pt x="0" y="169333"/>
+                  </a:moveTo>
+                  <a:cubicBezTo>
+                    <a:pt x="0" y="75813"/>
+                    <a:pt x="75813" y="0"/>
+                    <a:pt x="169333" y="0"/>
+                  </a:cubicBezTo>
+                  <a:lnTo>
+                    <a:pt x="7958667" y="0"/>
+                  </a:lnTo>
+                  <a:cubicBezTo>
+                    <a:pt x="8052187" y="0"/>
+                    <a:pt x="8128000" y="75813"/>
+                    <a:pt x="8128000" y="169333"/>
+                  </a:cubicBezTo>
+                  <a:lnTo>
+                    <a:pt x="8128000" y="1524000"/>
+                  </a:lnTo>
+                  <a:cubicBezTo>
+                    <a:pt x="8128000" y="1617520"/>
+                    <a:pt x="8052187" y="1693333"/>
+                    <a:pt x="7958667" y="1693333"/>
+                  </a:cubicBezTo>
+                  <a:lnTo>
+                    <a:pt x="169333" y="1693333"/>
+                  </a:lnTo>
+                  <a:cubicBezTo>
+                    <a:pt x="75813" y="1693333"/>
+                    <a:pt x="0" y="1617520"/>
+                    <a:pt x="0" y="1524000"/>
+                  </a:cubicBezTo>
+                  <a:lnTo>
+                    <a:pt x="0" y="169333"/>
+                  </a:lnTo>
+                  <a:close/>
+                </a:path>
+              </a:pathLst>
+            </a:custGeom>
+          </p:spPr>
+          <p:style>
+            <a:lnRef idx="2">
+              <a:schemeClr val="lt1">
+                <a:hueOff val="0"/>
+                <a:satOff val="0"/>
+                <a:lumOff val="0"/>
+                <a:alphaOff val="0"/>
+              </a:schemeClr>
+            </a:lnRef>
+            <a:fillRef idx="1">
+              <a:schemeClr val="accent1">
+                <a:hueOff val="0"/>
+                <a:satOff val="0"/>
+                <a:lumOff val="0"/>
+                <a:alphaOff val="0"/>
+              </a:schemeClr>
+            </a:fillRef>
+            <a:effectRef idx="0">
+              <a:schemeClr val="accent1">
+                <a:hueOff val="0"/>
+                <a:satOff val="0"/>
+                <a:lumOff val="0"/>
+                <a:alphaOff val="0"/>
+              </a:schemeClr>
+            </a:effectRef>
+            <a:fontRef idx="minor">
+              <a:schemeClr val="lt1"/>
+            </a:fontRef>
+          </p:style>
+          <p:txBody>
+            <a:bodyPr spcFirstLastPara="0" vert="horz" wrap="square" lIns="1886373" tIns="91440" rIns="91441" bIns="91440" numCol="1" spcCol="1270" anchor="t" anchorCtr="0">
+              <a:noAutofit/>
+            </a:bodyPr>
+            <a:lstStyle/>
+            <a:p>
+              <a:pPr lvl="0" algn="l" defTabSz="1066800" latinLnBrk="1">
+                <a:lnSpc>
+                  <a:spcPct val="90000"/>
+                </a:lnSpc>
+                <a:spcBef>
+                  <a:spcPct val="0"/>
+                </a:spcBef>
+                <a:spcAft>
+                  <a:spcPct val="35000"/>
+                </a:spcAft>
+              </a:pPr>
+              <a:endParaRPr lang="ko-KR" altLang="en-US" sz="2400" kern="1200"/>
+            </a:p>
+            <a:p>
+              <a:pPr marL="171450" lvl="1" indent="-171450" algn="l" defTabSz="844550" latinLnBrk="1">
+                <a:lnSpc>
+                  <a:spcPct val="90000"/>
+                </a:lnSpc>
+                <a:spcBef>
+                  <a:spcPct val="0"/>
+                </a:spcBef>
+                <a:spcAft>
+                  <a:spcPct val="15000"/>
+                </a:spcAft>
+                <a:buChar char="••"/>
+              </a:pPr>
+              <a:endParaRPr lang="ko-KR" altLang="en-US" sz="1900" kern="1200"/>
+            </a:p>
+            <a:p>
+              <a:pPr marL="171450" lvl="1" indent="-171450" algn="l" defTabSz="844550" latinLnBrk="1">
+                <a:lnSpc>
+                  <a:spcPct val="90000"/>
+                </a:lnSpc>
+                <a:spcBef>
+                  <a:spcPct val="0"/>
+                </a:spcBef>
+                <a:spcAft>
+                  <a:spcPct val="15000"/>
+                </a:spcAft>
+                <a:buChar char="••"/>
+              </a:pPr>
+              <a:endParaRPr lang="ko-KR" altLang="en-US" sz="1900" kern="1200"/>
+            </a:p>
+          </p:txBody>
+        </p:sp>
+        <p:sp>
+          <p:nvSpPr>
+            <p:cNvPr id="10" name="자유형 9"/>
+            <p:cNvSpPr/>
+            <p:nvPr/>
+          </p:nvSpPr>
+          <p:spPr>
+            <a:xfrm>
+              <a:off x="778645" y="4717525"/>
+              <a:ext cx="8128000" cy="1693333"/>
+            </a:xfrm>
+            <a:custGeom>
+              <a:avLst/>
+              <a:gdLst>
+                <a:gd name="connsiteX0" fmla="*/ 0 w 8128000"/>
+                <a:gd name="connsiteY0" fmla="*/ 169333 h 1693333"/>
+                <a:gd name="connsiteX1" fmla="*/ 169333 w 8128000"/>
+                <a:gd name="connsiteY1" fmla="*/ 0 h 1693333"/>
+                <a:gd name="connsiteX2" fmla="*/ 7958667 w 8128000"/>
+                <a:gd name="connsiteY2" fmla="*/ 0 h 1693333"/>
+                <a:gd name="connsiteX3" fmla="*/ 8128000 w 8128000"/>
+                <a:gd name="connsiteY3" fmla="*/ 169333 h 1693333"/>
+                <a:gd name="connsiteX4" fmla="*/ 8128000 w 8128000"/>
+                <a:gd name="connsiteY4" fmla="*/ 1524000 h 1693333"/>
+                <a:gd name="connsiteX5" fmla="*/ 7958667 w 8128000"/>
+                <a:gd name="connsiteY5" fmla="*/ 1693333 h 1693333"/>
+                <a:gd name="connsiteX6" fmla="*/ 169333 w 8128000"/>
+                <a:gd name="connsiteY6" fmla="*/ 1693333 h 1693333"/>
+                <a:gd name="connsiteX7" fmla="*/ 0 w 8128000"/>
+                <a:gd name="connsiteY7" fmla="*/ 1524000 h 1693333"/>
+                <a:gd name="connsiteX8" fmla="*/ 0 w 8128000"/>
+                <a:gd name="connsiteY8" fmla="*/ 169333 h 1693333"/>
+              </a:gdLst>
+              <a:ahLst/>
+              <a:cxnLst>
+                <a:cxn ang="0">
+                  <a:pos x="connsiteX0" y="connsiteY0"/>
+                </a:cxn>
+                <a:cxn ang="0">
+                  <a:pos x="connsiteX1" y="connsiteY1"/>
+                </a:cxn>
+                <a:cxn ang="0">
+                  <a:pos x="connsiteX2" y="connsiteY2"/>
+                </a:cxn>
+                <a:cxn ang="0">
+                  <a:pos x="connsiteX3" y="connsiteY3"/>
+                </a:cxn>
+                <a:cxn ang="0">
+                  <a:pos x="connsiteX4" y="connsiteY4"/>
+                </a:cxn>
+                <a:cxn ang="0">
+                  <a:pos x="connsiteX5" y="connsiteY5"/>
+                </a:cxn>
+                <a:cxn ang="0">
+                  <a:pos x="connsiteX6" y="connsiteY6"/>
+                </a:cxn>
+                <a:cxn ang="0">
+                  <a:pos x="connsiteX7" y="connsiteY7"/>
+                </a:cxn>
+                <a:cxn ang="0">
+                  <a:pos x="connsiteX8" y="connsiteY8"/>
+                </a:cxn>
+              </a:cxnLst>
+              <a:rect l="l" t="t" r="r" b="b"/>
+              <a:pathLst>
+                <a:path w="8128000" h="1693333">
+                  <a:moveTo>
+                    <a:pt x="0" y="169333"/>
+                  </a:moveTo>
+                  <a:cubicBezTo>
+                    <a:pt x="0" y="75813"/>
+                    <a:pt x="75813" y="0"/>
+                    <a:pt x="169333" y="0"/>
+                  </a:cubicBezTo>
+                  <a:lnTo>
+                    <a:pt x="7958667" y="0"/>
+                  </a:lnTo>
+                  <a:cubicBezTo>
+                    <a:pt x="8052187" y="0"/>
+                    <a:pt x="8128000" y="75813"/>
+                    <a:pt x="8128000" y="169333"/>
+                  </a:cubicBezTo>
+                  <a:lnTo>
+                    <a:pt x="8128000" y="1524000"/>
+                  </a:lnTo>
+                  <a:cubicBezTo>
+                    <a:pt x="8128000" y="1617520"/>
+                    <a:pt x="8052187" y="1693333"/>
+                    <a:pt x="7958667" y="1693333"/>
+                  </a:cubicBezTo>
+                  <a:lnTo>
+                    <a:pt x="169333" y="1693333"/>
+                  </a:lnTo>
+                  <a:cubicBezTo>
+                    <a:pt x="75813" y="1693333"/>
+                    <a:pt x="0" y="1617520"/>
+                    <a:pt x="0" y="1524000"/>
+                  </a:cubicBezTo>
+                  <a:lnTo>
+                    <a:pt x="0" y="169333"/>
+                  </a:lnTo>
+                  <a:close/>
+                </a:path>
+              </a:pathLst>
+            </a:custGeom>
+          </p:spPr>
+          <p:style>
+            <a:lnRef idx="2">
+              <a:schemeClr val="lt1">
+                <a:hueOff val="0"/>
+                <a:satOff val="0"/>
+                <a:lumOff val="0"/>
+                <a:alphaOff val="0"/>
+              </a:schemeClr>
+            </a:lnRef>
+            <a:fillRef idx="1">
+              <a:schemeClr val="accent1">
+                <a:hueOff val="0"/>
+                <a:satOff val="0"/>
+                <a:lumOff val="0"/>
+                <a:alphaOff val="0"/>
+              </a:schemeClr>
+            </a:fillRef>
+            <a:effectRef idx="0">
+              <a:schemeClr val="accent1">
+                <a:hueOff val="0"/>
+                <a:satOff val="0"/>
+                <a:lumOff val="0"/>
+                <a:alphaOff val="0"/>
+              </a:schemeClr>
+            </a:effectRef>
+            <a:fontRef idx="minor">
+              <a:schemeClr val="lt1"/>
+            </a:fontRef>
+          </p:style>
+          <p:txBody>
+            <a:bodyPr spcFirstLastPara="0" vert="horz" wrap="square" lIns="1886373" tIns="91440" rIns="91441" bIns="91440" numCol="1" spcCol="1270" anchor="t" anchorCtr="0">
+              <a:noAutofit/>
+            </a:bodyPr>
+            <a:lstStyle/>
+            <a:p>
+              <a:pPr lvl="0" algn="l" defTabSz="1066800" latinLnBrk="1">
+                <a:lnSpc>
+                  <a:spcPct val="90000"/>
+                </a:lnSpc>
+                <a:spcBef>
+                  <a:spcPct val="0"/>
+                </a:spcBef>
+                <a:spcAft>
+                  <a:spcPct val="35000"/>
+                </a:spcAft>
+              </a:pPr>
+              <a:endParaRPr lang="ko-KR" altLang="en-US" sz="2400" kern="1200"/>
+            </a:p>
+            <a:p>
+              <a:pPr marL="171450" lvl="1" indent="-171450" algn="l" defTabSz="844550" latinLnBrk="1">
+                <a:lnSpc>
+                  <a:spcPct val="90000"/>
+                </a:lnSpc>
+                <a:spcBef>
+                  <a:spcPct val="0"/>
+                </a:spcBef>
+                <a:spcAft>
+                  <a:spcPct val="15000"/>
+                </a:spcAft>
+                <a:buChar char="••"/>
+              </a:pPr>
+              <a:endParaRPr lang="ko-KR" altLang="en-US" sz="1900" kern="1200"/>
+            </a:p>
+            <a:p>
+              <a:pPr marL="171450" lvl="1" indent="-171450" algn="l" defTabSz="844550" latinLnBrk="1">
+                <a:lnSpc>
+                  <a:spcPct val="90000"/>
+                </a:lnSpc>
+                <a:spcBef>
+                  <a:spcPct val="0"/>
+                </a:spcBef>
+                <a:spcAft>
+                  <a:spcPct val="15000"/>
+                </a:spcAft>
+                <a:buChar char="••"/>
+              </a:pPr>
+              <a:endParaRPr lang="ko-KR" altLang="en-US" sz="1900" kern="1200"/>
+            </a:p>
+          </p:txBody>
+        </p:sp>
+      </p:grpSp>
     </p:spTree>
     <p:extLst>
       <p:ext uri="{BB962C8B-B14F-4D97-AF65-F5344CB8AC3E}">
-        <p14:creationId xmlns:p14="http://schemas.microsoft.com/office/powerpoint/2010/main" val="2272494223"/>
+        <p14:creationId xmlns:p14="http://schemas.microsoft.com/office/powerpoint/2010/main" val="858118093"/>
       </p:ext>
     </p:extLst>
   </p:cSld>
@@ -6840,168 +7091,14 @@
                             </p:stCondLst>
                             <p:childTnLst>
                               <p:par>
-                                <p:cTn id="5" presetID="2" presetClass="entr" presetSubtype="2" fill="hold" grpId="0" nodeType="withEffect">
-                                  <p:stCondLst>
-                                    <p:cond delay="0"/>
-                                  </p:stCondLst>
-                                  <p:childTnLst>
-                                    <p:set>
-                                      <p:cBhvr>
-                                        <p:cTn id="6" dur="1" fill="hold">
-                                          <p:stCondLst>
-                                            <p:cond delay="0"/>
-                                          </p:stCondLst>
-                                        </p:cTn>
-                                        <p:tgtEl>
-                                          <p:spTgt spid="22"/>
-                                        </p:tgtEl>
-                                        <p:attrNameLst>
-                                          <p:attrName>style.visibility</p:attrName>
-                                        </p:attrNameLst>
-                                      </p:cBhvr>
-                                      <p:to>
-                                        <p:strVal val="visible"/>
-                                      </p:to>
-                                    </p:set>
-                                    <p:anim calcmode="lin" valueType="num">
-                                      <p:cBhvr additive="base">
-                                        <p:cTn id="7" dur="500" fill="hold"/>
-                                        <p:tgtEl>
-                                          <p:spTgt spid="22"/>
-                                        </p:tgtEl>
-                                        <p:attrNameLst>
-                                          <p:attrName>ppt_x</p:attrName>
-                                        </p:attrNameLst>
-                                      </p:cBhvr>
-                                      <p:tavLst>
-                                        <p:tav tm="0">
-                                          <p:val>
-                                            <p:strVal val="1+#ppt_w/2"/>
-                                          </p:val>
-                                        </p:tav>
-                                        <p:tav tm="100000">
-                                          <p:val>
-                                            <p:strVal val="#ppt_x"/>
-                                          </p:val>
-                                        </p:tav>
-                                      </p:tavLst>
-                                    </p:anim>
-                                    <p:anim calcmode="lin" valueType="num">
-                                      <p:cBhvr additive="base">
-                                        <p:cTn id="8" dur="500" fill="hold"/>
-                                        <p:tgtEl>
-                                          <p:spTgt spid="22"/>
-                                        </p:tgtEl>
-                                        <p:attrNameLst>
-                                          <p:attrName>ppt_y</p:attrName>
-                                        </p:attrNameLst>
-                                      </p:cBhvr>
-                                      <p:tavLst>
-                                        <p:tav tm="0">
-                                          <p:val>
-                                            <p:strVal val="#ppt_y"/>
-                                          </p:val>
-                                        </p:tav>
-                                        <p:tav tm="100000">
-                                          <p:val>
-                                            <p:strVal val="#ppt_y"/>
-                                          </p:val>
-                                        </p:tav>
-                                      </p:tavLst>
-                                    </p:anim>
-                                  </p:childTnLst>
-                                </p:cTn>
-                              </p:par>
-                              <p:par>
-                                <p:cTn id="9" presetID="42" presetClass="entr" presetSubtype="0" fill="hold" grpId="0" nodeType="withEffect">
+                                <p:cTn id="5" presetID="10" presetClass="entr" presetSubtype="0" fill="hold" grpId="0" nodeType="withEffect">
                                   <p:stCondLst>
                                     <p:cond delay="500"/>
                                   </p:stCondLst>
                                   <p:childTnLst>
                                     <p:set>
                                       <p:cBhvr>
-                                        <p:cTn id="10" dur="1" fill="hold">
-                                          <p:stCondLst>
-                                            <p:cond delay="0"/>
-                                          </p:stCondLst>
-                                        </p:cTn>
-                                        <p:tgtEl>
-                                          <p:spTgt spid="23"/>
-                                        </p:tgtEl>
-                                        <p:attrNameLst>
-                                          <p:attrName>style.visibility</p:attrName>
-                                        </p:attrNameLst>
-                                      </p:cBhvr>
-                                      <p:to>
-                                        <p:strVal val="visible"/>
-                                      </p:to>
-                                    </p:set>
-                                    <p:animEffect transition="in" filter="fade">
-                                      <p:cBhvr>
-                                        <p:cTn id="11" dur="1000"/>
-                                        <p:tgtEl>
-                                          <p:spTgt spid="23"/>
-                                        </p:tgtEl>
-                                      </p:cBhvr>
-                                    </p:animEffect>
-                                    <p:anim calcmode="lin" valueType="num">
-                                      <p:cBhvr>
-                                        <p:cTn id="12" dur="1000" fill="hold"/>
-                                        <p:tgtEl>
-                                          <p:spTgt spid="23"/>
-                                        </p:tgtEl>
-                                        <p:attrNameLst>
-                                          <p:attrName>ppt_x</p:attrName>
-                                        </p:attrNameLst>
-                                      </p:cBhvr>
-                                      <p:tavLst>
-                                        <p:tav tm="0">
-                                          <p:val>
-                                            <p:strVal val="#ppt_x"/>
-                                          </p:val>
-                                        </p:tav>
-                                        <p:tav tm="100000">
-                                          <p:val>
-                                            <p:strVal val="#ppt_x"/>
-                                          </p:val>
-                                        </p:tav>
-                                      </p:tavLst>
-                                    </p:anim>
-                                    <p:anim calcmode="lin" valueType="num">
-                                      <p:cBhvr>
-                                        <p:cTn id="13" dur="1000" fill="hold"/>
-                                        <p:tgtEl>
-                                          <p:spTgt spid="23"/>
-                                        </p:tgtEl>
-                                        <p:attrNameLst>
-                                          <p:attrName>ppt_y</p:attrName>
-                                        </p:attrNameLst>
-                                      </p:cBhvr>
-                                      <p:tavLst>
-                                        <p:tav tm="0">
-                                          <p:val>
-                                            <p:strVal val="#ppt_y+.1"/>
-                                          </p:val>
-                                        </p:tav>
-                                        <p:tav tm="100000">
-                                          <p:val>
-                                            <p:strVal val="#ppt_y"/>
-                                          </p:val>
-                                        </p:tav>
-                                      </p:tavLst>
-                                    </p:anim>
-                                  </p:childTnLst>
-                                </p:cTn>
-                              </p:par>
-                              <p:par>
-                                <p:cTn id="14" presetID="10" presetClass="entr" presetSubtype="0" fill="hold" grpId="0" nodeType="withEffect">
-                                  <p:stCondLst>
-                                    <p:cond delay="500"/>
-                                  </p:stCondLst>
-                                  <p:childTnLst>
-                                    <p:set>
-                                      <p:cBhvr>
-                                        <p:cTn id="15" dur="1" fill="hold">
+                                        <p:cTn id="6" dur="1" fill="hold">
                                           <p:stCondLst>
                                             <p:cond delay="0"/>
                                           </p:stCondLst>
@@ -7019,7 +7116,7 @@
                                     </p:set>
                                     <p:animEffect transition="in" filter="fade">
                                       <p:cBhvr>
-                                        <p:cTn id="16" dur="500"/>
+                                        <p:cTn id="7" dur="500"/>
                                         <p:tgtEl>
                                           <p:spTgt spid="11"/>
                                         </p:tgtEl>
@@ -7056,8 +7153,6 @@
       </p:par>
     </p:tnLst>
     <p:bldLst>
-      <p:bldP spid="22" grpId="0" animBg="1"/>
-      <p:bldP spid="23" grpId="0" animBg="1"/>
       <p:bldP spid="11" grpId="0"/>
     </p:bldLst>
   </p:timing>
@@ -7388,100 +7483,6 @@
       </p:grpSp>
       <p:sp>
         <p:nvSpPr>
-          <p:cNvPr id="22" name="직사각형 21"/>
-          <p:cNvSpPr/>
-          <p:nvPr/>
-        </p:nvSpPr>
-        <p:spPr>
-          <a:xfrm>
-            <a:off x="8910608" y="-8817"/>
-            <a:ext cx="3303931" cy="6858000"/>
-          </a:xfrm>
-          <a:prstGeom prst="rect">
-            <a:avLst/>
-          </a:prstGeom>
-          <a:solidFill>
-            <a:schemeClr val="tx2">
-              <a:lumMod val="75000"/>
-            </a:schemeClr>
-          </a:solidFill>
-          <a:ln>
-            <a:noFill/>
-          </a:ln>
-        </p:spPr>
-        <p:style>
-          <a:lnRef idx="2">
-            <a:schemeClr val="accent1">
-              <a:shade val="50000"/>
-            </a:schemeClr>
-          </a:lnRef>
-          <a:fillRef idx="1">
-            <a:schemeClr val="accent1"/>
-          </a:fillRef>
-          <a:effectRef idx="0">
-            <a:schemeClr val="accent1"/>
-          </a:effectRef>
-          <a:fontRef idx="minor">
-            <a:schemeClr val="lt1"/>
-          </a:fontRef>
-        </p:style>
-        <p:txBody>
-          <a:bodyPr rtlCol="0" anchor="ctr"/>
-          <a:lstStyle/>
-          <a:p>
-            <a:pPr algn="ctr"/>
-            <a:endParaRPr lang="ko-KR" altLang="en-US" sz="2200" dirty="0"/>
-          </a:p>
-        </p:txBody>
-      </p:sp>
-      <p:sp>
-        <p:nvSpPr>
-          <p:cNvPr id="23" name="직각 삼각형 22"/>
-          <p:cNvSpPr/>
-          <p:nvPr/>
-        </p:nvSpPr>
-        <p:spPr>
-          <a:xfrm flipH="1">
-            <a:off x="10312768" y="5029200"/>
-            <a:ext cx="1901777" cy="1828800"/>
-          </a:xfrm>
-          <a:prstGeom prst="rtTriangle">
-            <a:avLst/>
-          </a:prstGeom>
-          <a:solidFill>
-            <a:schemeClr val="bg1"/>
-          </a:solidFill>
-          <a:ln>
-            <a:noFill/>
-          </a:ln>
-        </p:spPr>
-        <p:style>
-          <a:lnRef idx="2">
-            <a:schemeClr val="accent1">
-              <a:shade val="50000"/>
-            </a:schemeClr>
-          </a:lnRef>
-          <a:fillRef idx="1">
-            <a:schemeClr val="accent1"/>
-          </a:fillRef>
-          <a:effectRef idx="0">
-            <a:schemeClr val="accent1"/>
-          </a:effectRef>
-          <a:fontRef idx="minor">
-            <a:schemeClr val="lt1"/>
-          </a:fontRef>
-        </p:style>
-        <p:txBody>
-          <a:bodyPr rtlCol="0" anchor="ctr"/>
-          <a:lstStyle/>
-          <a:p>
-            <a:pPr algn="ctr"/>
-            <a:endParaRPr lang="ko-KR" altLang="en-US"/>
-          </a:p>
-        </p:txBody>
-      </p:sp>
-      <p:sp>
-        <p:nvSpPr>
           <p:cNvPr id="4" name="제목 3"/>
           <p:cNvSpPr>
             <a:spLocks noGrp="1"/>
@@ -7506,7 +7507,7 @@
                   <a:schemeClr val="bg1"/>
                 </a:solidFill>
               </a:rPr>
-              <a:t>프로젝트 진행도</a:t>
+              <a:t>남은 기간 동안 할 것</a:t>
             </a:r>
             <a:endParaRPr lang="ko-KR" altLang="en-US" sz="3200" dirty="0">
               <a:solidFill>
@@ -7516,16 +7517,106 @@
           </a:p>
         </p:txBody>
       </p:sp>
+      <p:pic>
+        <p:nvPicPr>
+          <p:cNvPr id="2" name="그림 1"/>
+          <p:cNvPicPr>
+            <a:picLocks noChangeAspect="1"/>
+          </p:cNvPicPr>
+          <p:nvPr/>
+        </p:nvPicPr>
+        <p:blipFill>
+          <a:blip r:embed="rId3">
+            <a:extLst>
+              <a:ext uri="{28A0092B-C50C-407E-A947-70E740481C1C}">
+                <a14:useLocalDpi xmlns:a14="http://schemas.microsoft.com/office/drawing/2010/main" val="0"/>
+              </a:ext>
+            </a:extLst>
+          </a:blip>
+          <a:stretch>
+            <a:fillRect/>
+          </a:stretch>
+        </p:blipFill>
+        <p:spPr>
+          <a:xfrm>
+            <a:off x="1788103" y="2796166"/>
+            <a:ext cx="1300593" cy="1300593"/>
+          </a:xfrm>
+          <a:prstGeom prst="rect">
+            <a:avLst/>
+          </a:prstGeom>
+        </p:spPr>
+      </p:pic>
+      <p:pic>
+        <p:nvPicPr>
+          <p:cNvPr id="3" name="그림 2"/>
+          <p:cNvPicPr>
+            <a:picLocks noChangeAspect="1"/>
+          </p:cNvPicPr>
+          <p:nvPr/>
+        </p:nvPicPr>
+        <p:blipFill>
+          <a:blip r:embed="rId4">
+            <a:extLst>
+              <a:ext uri="{28A0092B-C50C-407E-A947-70E740481C1C}">
+                <a14:useLocalDpi xmlns:a14="http://schemas.microsoft.com/office/drawing/2010/main" val="0"/>
+              </a:ext>
+            </a:extLst>
+          </a:blip>
+          <a:stretch>
+            <a:fillRect/>
+          </a:stretch>
+        </p:blipFill>
+        <p:spPr>
+          <a:xfrm>
+            <a:off x="5086998" y="2796166"/>
+            <a:ext cx="1300593" cy="1300593"/>
+          </a:xfrm>
+          <a:prstGeom prst="rect">
+            <a:avLst/>
+          </a:prstGeom>
+        </p:spPr>
+      </p:pic>
+      <p:pic>
+        <p:nvPicPr>
+          <p:cNvPr id="13" name="그림 12"/>
+          <p:cNvPicPr>
+            <a:picLocks noChangeAspect="1"/>
+          </p:cNvPicPr>
+          <p:nvPr/>
+        </p:nvPicPr>
+        <p:blipFill>
+          <a:blip r:embed="rId5">
+            <a:extLst>
+              <a:ext uri="{28A0092B-C50C-407E-A947-70E740481C1C}">
+                <a14:useLocalDpi xmlns:a14="http://schemas.microsoft.com/office/drawing/2010/main" val="0"/>
+              </a:ext>
+            </a:extLst>
+          </a:blip>
+          <a:stretch>
+            <a:fillRect/>
+          </a:stretch>
+        </p:blipFill>
+        <p:spPr>
+          <a:xfrm>
+            <a:off x="8385893" y="2507339"/>
+            <a:ext cx="1878245" cy="1878245"/>
+          </a:xfrm>
+          <a:prstGeom prst="rect">
+            <a:avLst/>
+          </a:prstGeom>
+        </p:spPr>
+      </p:pic>
       <p:sp>
         <p:nvSpPr>
-          <p:cNvPr id="11" name="TextBox 10"/>
+          <p:cNvPr id="14" name="TextBox 13"/>
           <p:cNvSpPr txBox="1"/>
           <p:nvPr/>
         </p:nvSpPr>
         <p:spPr>
           <a:xfrm>
-            <a:off x="3255469" y="2986634"/>
-            <a:ext cx="2755687" cy="2308324"/>
+            <a:off x="1871573" y="4324898"/>
+            <a:ext cx="1133651" cy="584775"/>
           </a:xfrm>
           <a:prstGeom prst="rect">
             <a:avLst/>
@@ -7539,108 +7630,86 @@
           <a:lstStyle/>
           <a:p>
             <a:r>
-              <a:rPr lang="ko-KR" altLang="en-US" dirty="0" smtClean="0">
+              <a:rPr lang="en-US" altLang="ko-KR" sz="3200" dirty="0" smtClean="0">
                 <a:solidFill>
                   <a:schemeClr val="bg1"/>
                 </a:solidFill>
               </a:rPr>
-              <a:t>우리 프로젝트는 전체에서 이정도 </a:t>
+              <a:t>Test</a:t>
             </a:r>
+          </a:p>
+        </p:txBody>
+      </p:sp>
+      <p:sp>
+        <p:nvSpPr>
+          <p:cNvPr id="15" name="TextBox 14"/>
+          <p:cNvSpPr txBox="1"/>
+          <p:nvPr/>
+        </p:nvSpPr>
+        <p:spPr>
+          <a:xfrm>
+            <a:off x="4846320" y="4324897"/>
+            <a:ext cx="2514600" cy="584775"/>
+          </a:xfrm>
+          <a:prstGeom prst="rect">
+            <a:avLst/>
+          </a:prstGeom>
+          <a:noFill/>
+        </p:spPr>
+        <p:txBody>
+          <a:bodyPr wrap="square" rtlCol="0">
+            <a:spAutoFit/>
+          </a:bodyPr>
+          <a:lstStyle/>
+          <a:p>
             <a:r>
-              <a:rPr lang="ko-KR" altLang="en-US" dirty="0" smtClean="0">
+              <a:rPr lang="en-US" altLang="ko-KR" sz="3200" dirty="0" smtClean="0">
                 <a:solidFill>
                   <a:schemeClr val="bg1"/>
                 </a:solidFill>
               </a:rPr>
-              <a:t>진행되었다</a:t>
+              <a:t>Promotion</a:t>
             </a:r>
-            <a:endParaRPr lang="en-US" altLang="ko-KR" dirty="0" smtClean="0">
-              <a:solidFill>
-                <a:schemeClr val="bg1"/>
-              </a:solidFill>
-            </a:endParaRPr>
-          </a:p>
+          </a:p>
+        </p:txBody>
+      </p:sp>
+      <p:sp>
+        <p:nvSpPr>
+          <p:cNvPr id="16" name="TextBox 15"/>
+          <p:cNvSpPr txBox="1"/>
+          <p:nvPr/>
+        </p:nvSpPr>
+        <p:spPr>
+          <a:xfrm>
+            <a:off x="8591631" y="4324896"/>
+            <a:ext cx="1672507" cy="584775"/>
+          </a:xfrm>
+          <a:prstGeom prst="rect">
+            <a:avLst/>
+          </a:prstGeom>
+          <a:noFill/>
+        </p:spPr>
+        <p:txBody>
+          <a:bodyPr wrap="square" rtlCol="0">
+            <a:spAutoFit/>
+          </a:bodyPr>
+          <a:lstStyle/>
           <a:p>
             <a:r>
-              <a:rPr lang="ko-KR" altLang="en-US" dirty="0" smtClean="0">
+              <a:rPr lang="en-US" altLang="ko-KR" sz="3200" dirty="0" smtClean="0">
                 <a:solidFill>
                   <a:schemeClr val="bg1"/>
                 </a:solidFill>
               </a:rPr>
-              <a:t>전체는 </a:t>
+              <a:t>Release</a:t>
             </a:r>
-            <a:endParaRPr lang="en-US" altLang="ko-KR" dirty="0" smtClean="0">
-              <a:solidFill>
-                <a:schemeClr val="bg1"/>
-              </a:solidFill>
-            </a:endParaRPr>
-          </a:p>
-          <a:p>
-            <a:r>
-              <a:rPr lang="ko-KR" altLang="en-US" dirty="0" smtClean="0">
-                <a:solidFill>
-                  <a:schemeClr val="bg1"/>
-                </a:solidFill>
-              </a:rPr>
-              <a:t>게임 제작</a:t>
-            </a:r>
-            <a:endParaRPr lang="en-US" altLang="ko-KR" dirty="0" smtClean="0">
-              <a:solidFill>
-                <a:schemeClr val="bg1"/>
-              </a:solidFill>
-            </a:endParaRPr>
-          </a:p>
-          <a:p>
-            <a:r>
-              <a:rPr lang="ko-KR" altLang="en-US" dirty="0" smtClean="0">
-                <a:solidFill>
-                  <a:schemeClr val="bg1"/>
-                </a:solidFill>
-              </a:rPr>
-              <a:t>홍보</a:t>
-            </a:r>
-            <a:endParaRPr lang="en-US" altLang="ko-KR" dirty="0" smtClean="0">
-              <a:solidFill>
-                <a:schemeClr val="bg1"/>
-              </a:solidFill>
-            </a:endParaRPr>
-          </a:p>
-          <a:p>
-            <a:r>
-              <a:rPr lang="ko-KR" altLang="en-US" dirty="0" smtClean="0">
-                <a:solidFill>
-                  <a:schemeClr val="bg1"/>
-                </a:solidFill>
-              </a:rPr>
-              <a:t>출시이고</a:t>
-            </a:r>
-            <a:endParaRPr lang="en-US" altLang="ko-KR" dirty="0" smtClean="0">
-              <a:solidFill>
-                <a:schemeClr val="bg1"/>
-              </a:solidFill>
-            </a:endParaRPr>
-          </a:p>
-          <a:p>
-            <a:r>
-              <a:rPr lang="ko-KR" altLang="en-US" dirty="0" smtClean="0">
-                <a:solidFill>
-                  <a:schemeClr val="bg1"/>
-                </a:solidFill>
-              </a:rPr>
-              <a:t>지금은 게임 제작단계이다</a:t>
-            </a:r>
-            <a:endParaRPr lang="en-US" altLang="ko-KR" dirty="0">
-              <a:solidFill>
-                <a:schemeClr val="bg1"/>
-              </a:solidFill>
-            </a:endParaRPr>
           </a:p>
         </p:txBody>
       </p:sp>
     </p:spTree>
     <p:extLst>
       <p:ext uri="{BB962C8B-B14F-4D97-AF65-F5344CB8AC3E}">
-        <p14:creationId xmlns:p14="http://schemas.microsoft.com/office/powerpoint/2010/main" val="858118093"/>
+        <p14:creationId xmlns:p14="http://schemas.microsoft.com/office/powerpoint/2010/main" val="3740269144"/>
       </p:ext>
     </p:extLst>
   </p:cSld>
@@ -7659,9 +7728,6 @@
                     <p:cTn id="3" fill="hold">
                       <p:stCondLst>
                         <p:cond delay="indefinite"/>
-                        <p:cond evt="onBegin" delay="0">
-                          <p:tn val="2"/>
-                        </p:cond>
                       </p:stCondLst>
                       <p:childTnLst>
                         <p:par>
@@ -7671,7 +7737,7 @@
                             </p:stCondLst>
                             <p:childTnLst>
                               <p:par>
-                                <p:cTn id="5" presetID="2" presetClass="entr" presetSubtype="2" fill="hold" grpId="0" nodeType="withEffect">
+                                <p:cTn id="5" presetID="10" presetClass="entr" presetSubtype="0" fill="hold" nodeType="clickEffect">
                                   <p:stCondLst>
                                     <p:cond delay="0"/>
                                   </p:stCondLst>
@@ -7684,80 +7750,7 @@
                                           </p:stCondLst>
                                         </p:cTn>
                                         <p:tgtEl>
-                                          <p:spTgt spid="22"/>
-                                        </p:tgtEl>
-                                        <p:attrNameLst>
-                                          <p:attrName>style.visibility</p:attrName>
-                                        </p:attrNameLst>
-                                      </p:cBhvr>
-                                      <p:to>
-                                        <p:strVal val="visible"/>
-                                      </p:to>
-                                    </p:set>
-                                    <p:anim calcmode="lin" valueType="num">
-                                      <p:cBhvr additive="base">
-                                        <p:cTn id="7" dur="500" fill="hold"/>
-                                        <p:tgtEl>
-                                          <p:spTgt spid="22"/>
-                                        </p:tgtEl>
-                                        <p:attrNameLst>
-                                          <p:attrName>ppt_x</p:attrName>
-                                        </p:attrNameLst>
-                                      </p:cBhvr>
-                                      <p:tavLst>
-                                        <p:tav tm="0">
-                                          <p:val>
-                                            <p:strVal val="1+#ppt_w/2"/>
-                                          </p:val>
-                                        </p:tav>
-                                        <p:tav tm="100000">
-                                          <p:val>
-                                            <p:strVal val="#ppt_x"/>
-                                          </p:val>
-                                        </p:tav>
-                                      </p:tavLst>
-                                    </p:anim>
-                                    <p:anim calcmode="lin" valueType="num">
-                                      <p:cBhvr additive="base">
-                                        <p:cTn id="8" dur="500" fill="hold"/>
-                                        <p:tgtEl>
-                                          <p:spTgt spid="22"/>
-                                        </p:tgtEl>
-                                        <p:attrNameLst>
-                                          <p:attrName>ppt_y</p:attrName>
-                                        </p:attrNameLst>
-                                      </p:cBhvr>
-                                      <p:tavLst>
-                                        <p:tav tm="0">
-                                          <p:val>
-                                            <p:strVal val="#ppt_y"/>
-                                          </p:val>
-                                        </p:tav>
-                                        <p:tav tm="100000">
-                                          <p:val>
-                                            <p:strVal val="#ppt_y"/>
-                                          </p:val>
-                                        </p:tav>
-                                      </p:tavLst>
-                                    </p:anim>
-                                  </p:childTnLst>
-                                </p:cTn>
-                              </p:par>
-                              <p:par>
-                                <p:cTn id="9" presetID="42" presetClass="entr" presetSubtype="0" fill="hold" grpId="0" nodeType="withEffect">
-                                  <p:stCondLst>
-                                    <p:cond delay="500"/>
-                                  </p:stCondLst>
-                                  <p:childTnLst>
-                                    <p:set>
-                                      <p:cBhvr>
-                                        <p:cTn id="10" dur="1" fill="hold">
-                                          <p:stCondLst>
-                                            <p:cond delay="0"/>
-                                          </p:stCondLst>
-                                        </p:cTn>
-                                        <p:tgtEl>
-                                          <p:spTgt spid="23"/>
+                                          <p:spTgt spid="2"/>
                                         </p:tgtEl>
                                         <p:attrNameLst>
                                           <p:attrName>style.visibility</p:attrName>
@@ -7769,76 +7762,30 @@
                                     </p:set>
                                     <p:animEffect transition="in" filter="fade">
                                       <p:cBhvr>
-                                        <p:cTn id="11" dur="1000"/>
+                                        <p:cTn id="7" dur="500"/>
                                         <p:tgtEl>
-                                          <p:spTgt spid="23"/>
+                                          <p:spTgt spid="2"/>
                                         </p:tgtEl>
                                       </p:cBhvr>
                                     </p:animEffect>
-                                    <p:anim calcmode="lin" valueType="num">
-                                      <p:cBhvr>
-                                        <p:cTn id="12" dur="1000" fill="hold"/>
-                                        <p:tgtEl>
-                                          <p:spTgt spid="23"/>
-                                        </p:tgtEl>
-                                        <p:attrNameLst>
-                                          <p:attrName>ppt_x</p:attrName>
-                                        </p:attrNameLst>
-                                      </p:cBhvr>
-                                      <p:tavLst>
-                                        <p:tav tm="0">
-                                          <p:val>
-                                            <p:strVal val="#ppt_x"/>
-                                          </p:val>
-                                        </p:tav>
-                                        <p:tav tm="100000">
-                                          <p:val>
-                                            <p:strVal val="#ppt_x"/>
-                                          </p:val>
-                                        </p:tav>
-                                      </p:tavLst>
-                                    </p:anim>
-                                    <p:anim calcmode="lin" valueType="num">
-                                      <p:cBhvr>
-                                        <p:cTn id="13" dur="1000" fill="hold"/>
-                                        <p:tgtEl>
-                                          <p:spTgt spid="23"/>
-                                        </p:tgtEl>
-                                        <p:attrNameLst>
-                                          <p:attrName>ppt_y</p:attrName>
-                                        </p:attrNameLst>
-                                      </p:cBhvr>
-                                      <p:tavLst>
-                                        <p:tav tm="0">
-                                          <p:val>
-                                            <p:strVal val="#ppt_y+.1"/>
-                                          </p:val>
-                                        </p:tav>
-                                        <p:tav tm="100000">
-                                          <p:val>
-                                            <p:strVal val="#ppt_y"/>
-                                          </p:val>
-                                        </p:tav>
-                                      </p:tavLst>
-                                    </p:anim>
                                   </p:childTnLst>
                                 </p:cTn>
                               </p:par>
                               <p:par>
-                                <p:cTn id="14" presetID="10" presetClass="entr" presetSubtype="0" fill="hold" grpId="0" nodeType="withEffect">
+                                <p:cTn id="8" presetID="10" presetClass="entr" presetSubtype="0" fill="hold" grpId="0" nodeType="withEffect">
                                   <p:stCondLst>
-                                    <p:cond delay="500"/>
+                                    <p:cond delay="0"/>
                                   </p:stCondLst>
                                   <p:childTnLst>
                                     <p:set>
                                       <p:cBhvr>
-                                        <p:cTn id="15" dur="1" fill="hold">
+                                        <p:cTn id="9" dur="1" fill="hold">
                                           <p:stCondLst>
                                             <p:cond delay="0"/>
                                           </p:stCondLst>
                                         </p:cTn>
                                         <p:tgtEl>
-                                          <p:spTgt spid="11"/>
+                                          <p:spTgt spid="14"/>
                                         </p:tgtEl>
                                         <p:attrNameLst>
                                           <p:attrName>style.visibility</p:attrName>
@@ -7850,9 +7797,185 @@
                                     </p:set>
                                     <p:animEffect transition="in" filter="fade">
                                       <p:cBhvr>
-                                        <p:cTn id="16" dur="500"/>
+                                        <p:cTn id="10" dur="500"/>
                                         <p:tgtEl>
-                                          <p:spTgt spid="11"/>
+                                          <p:spTgt spid="14"/>
+                                        </p:tgtEl>
+                                      </p:cBhvr>
+                                    </p:animEffect>
+                                  </p:childTnLst>
+                                </p:cTn>
+                              </p:par>
+                            </p:childTnLst>
+                          </p:cTn>
+                        </p:par>
+                      </p:childTnLst>
+                    </p:cTn>
+                  </p:par>
+                  <p:par>
+                    <p:cTn id="11" fill="hold">
+                      <p:stCondLst>
+                        <p:cond delay="indefinite"/>
+                      </p:stCondLst>
+                      <p:childTnLst>
+                        <p:par>
+                          <p:cTn id="12" fill="hold">
+                            <p:stCondLst>
+                              <p:cond delay="0"/>
+                            </p:stCondLst>
+                            <p:childTnLst>
+                              <p:par>
+                                <p:cTn id="13" presetID="10" presetClass="entr" presetSubtype="0" fill="hold" nodeType="clickEffect">
+                                  <p:stCondLst>
+                                    <p:cond delay="0"/>
+                                  </p:stCondLst>
+                                  <p:childTnLst>
+                                    <p:set>
+                                      <p:cBhvr>
+                                        <p:cTn id="14" dur="1" fill="hold">
+                                          <p:stCondLst>
+                                            <p:cond delay="0"/>
+                                          </p:stCondLst>
+                                        </p:cTn>
+                                        <p:tgtEl>
+                                          <p:spTgt spid="3"/>
+                                        </p:tgtEl>
+                                        <p:attrNameLst>
+                                          <p:attrName>style.visibility</p:attrName>
+                                        </p:attrNameLst>
+                                      </p:cBhvr>
+                                      <p:to>
+                                        <p:strVal val="visible"/>
+                                      </p:to>
+                                    </p:set>
+                                    <p:animEffect transition="in" filter="fade">
+                                      <p:cBhvr>
+                                        <p:cTn id="15" dur="500"/>
+                                        <p:tgtEl>
+                                          <p:spTgt spid="3"/>
+                                        </p:tgtEl>
+                                      </p:cBhvr>
+                                    </p:animEffect>
+                                  </p:childTnLst>
+                                </p:cTn>
+                              </p:par>
+                              <p:par>
+                                <p:cTn id="16" presetID="10" presetClass="entr" presetSubtype="0" fill="hold" grpId="0" nodeType="withEffect">
+                                  <p:stCondLst>
+                                    <p:cond delay="0"/>
+                                  </p:stCondLst>
+                                  <p:childTnLst>
+                                    <p:set>
+                                      <p:cBhvr>
+                                        <p:cTn id="17" dur="1" fill="hold">
+                                          <p:stCondLst>
+                                            <p:cond delay="0"/>
+                                          </p:stCondLst>
+                                        </p:cTn>
+                                        <p:tgtEl>
+                                          <p:spTgt spid="15"/>
+                                        </p:tgtEl>
+                                        <p:attrNameLst>
+                                          <p:attrName>style.visibility</p:attrName>
+                                        </p:attrNameLst>
+                                      </p:cBhvr>
+                                      <p:to>
+                                        <p:strVal val="visible"/>
+                                      </p:to>
+                                    </p:set>
+                                    <p:animEffect transition="in" filter="fade">
+                                      <p:cBhvr>
+                                        <p:cTn id="18" dur="500"/>
+                                        <p:tgtEl>
+                                          <p:spTgt spid="15"/>
+                                        </p:tgtEl>
+                                      </p:cBhvr>
+                                    </p:animEffect>
+                                  </p:childTnLst>
+                                </p:cTn>
+                              </p:par>
+                            </p:childTnLst>
+                          </p:cTn>
+                        </p:par>
+                      </p:childTnLst>
+                    </p:cTn>
+                  </p:par>
+                  <p:par>
+                    <p:cTn id="19" fill="hold">
+                      <p:stCondLst>
+                        <p:cond delay="indefinite"/>
+                      </p:stCondLst>
+                      <p:childTnLst>
+                        <p:par>
+                          <p:cTn id="20" fill="hold">
+                            <p:stCondLst>
+                              <p:cond delay="0"/>
+                            </p:stCondLst>
+                            <p:childTnLst>
+                              <p:par>
+                                <p:cTn id="21" presetID="10" presetClass="entr" presetSubtype="0" fill="hold" nodeType="clickEffect">
+                                  <p:stCondLst>
+                                    <p:cond delay="0"/>
+                                  </p:stCondLst>
+                                  <p:childTnLst>
+                                    <p:set>
+                                      <p:cBhvr>
+                                        <p:cTn id="22" dur="1" fill="hold">
+                                          <p:stCondLst>
+                                            <p:cond delay="0"/>
+                                          </p:stCondLst>
+                                        </p:cTn>
+                                        <p:tgtEl>
+                                          <p:spTgt spid="13"/>
+                                        </p:tgtEl>
+                                        <p:attrNameLst>
+                                          <p:attrName>style.visibility</p:attrName>
+                                        </p:attrNameLst>
+                                      </p:cBhvr>
+                                      <p:to>
+                                        <p:strVal val="visible"/>
+                                      </p:to>
+                                    </p:set>
+                                    <p:animEffect transition="in" filter="fade">
+                                      <p:cBhvr>
+                                        <p:cTn id="23" dur="500"/>
+                                        <p:tgtEl>
+                                          <p:spTgt spid="13"/>
+                                        </p:tgtEl>
+                                      </p:cBhvr>
+                                    </p:animEffect>
+                                  </p:childTnLst>
+                                </p:cTn>
+                              </p:par>
+                              <p:par>
+                                <p:cTn id="24" presetID="10" presetClass="entr" presetSubtype="0" fill="hold" grpId="0" nodeType="withEffect">
+                                  <p:stCondLst>
+                                    <p:cond delay="0"/>
+                                  </p:stCondLst>
+                                  <p:childTnLst>
+                                    <p:set>
+                                      <p:cBhvr>
+                                        <p:cTn id="25" dur="1" fill="hold">
+                                          <p:stCondLst>
+                                            <p:cond delay="0"/>
+                                          </p:stCondLst>
+                                        </p:cTn>
+                                        <p:tgtEl>
+                                          <p:spTgt spid="16"/>
+                                        </p:tgtEl>
+                                        <p:attrNameLst>
+                                          <p:attrName>style.visibility</p:attrName>
+                                        </p:attrNameLst>
+                                      </p:cBhvr>
+                                      <p:to>
+                                        <p:strVal val="visible"/>
+                                      </p:to>
+                                    </p:set>
+                                    <p:animEffect transition="in" filter="fade">
+                                      <p:cBhvr>
+                                        <p:cTn id="26" dur="500"/>
+                                        <p:tgtEl>
+                                          <p:spTgt spid="16"/>
                                         </p:tgtEl>
                                       </p:cBhvr>
                                     </p:animEffect>
@@ -7887,794 +8010,15 @@
       </p:par>
     </p:tnLst>
     <p:bldLst>
-      <p:bldP spid="22" grpId="0" animBg="1"/>
-      <p:bldP spid="23" grpId="0" animBg="1"/>
-      <p:bldP spid="11" grpId="0"/>
+      <p:bldP spid="14" grpId="0"/>
+      <p:bldP spid="15" grpId="0"/>
+      <p:bldP spid="16" grpId="0"/>
     </p:bldLst>
   </p:timing>
 </p:sld>
 </file>
 
 <file path=ppt/slides/slide7.xml><?xml version="1.0" encoding="utf-8"?>
-<p:sld xmlns:a="http://schemas.openxmlformats.org/drawingml/2006/main" xmlns:r="http://schemas.openxmlformats.org/officeDocument/2006/relationships" xmlns:p="http://schemas.openxmlformats.org/presentationml/2006/main">
-  <p:cSld>
-    <p:spTree>
-      <p:nvGrpSpPr>
-        <p:cNvPr id="1" name=""/>
-        <p:cNvGrpSpPr/>
-        <p:nvPr/>
-      </p:nvGrpSpPr>
-      <p:grpSpPr>
-        <a:xfrm>
-          <a:off x="0" y="0"/>
-          <a:ext cx="0" cy="0"/>
-          <a:chOff x="0" y="0"/>
-          <a:chExt cx="0" cy="0"/>
-        </a:xfrm>
-      </p:grpSpPr>
-      <p:sp>
-        <p:nvSpPr>
-          <p:cNvPr id="2240" name="이등변 삼각형 2239"/>
-          <p:cNvSpPr/>
-          <p:nvPr/>
-        </p:nvSpPr>
-        <p:spPr>
-          <a:xfrm>
-            <a:off x="6011156" y="100492"/>
-            <a:ext cx="1203569" cy="954593"/>
-          </a:xfrm>
-          <a:prstGeom prst="triangle">
-            <a:avLst/>
-          </a:prstGeom>
-          <a:solidFill>
-            <a:srgbClr val="222222"/>
-          </a:solidFill>
-          <a:ln>
-            <a:noFill/>
-          </a:ln>
-          <a:effectLst>
-            <a:outerShdw blurRad="50800" dist="38100" dir="18900000" algn="bl" rotWithShape="0">
-              <a:prstClr val="black">
-                <a:alpha val="40000"/>
-              </a:prstClr>
-            </a:outerShdw>
-          </a:effectLst>
-        </p:spPr>
-        <p:style>
-          <a:lnRef idx="2">
-            <a:schemeClr val="accent1">
-              <a:shade val="50000"/>
-            </a:schemeClr>
-          </a:lnRef>
-          <a:fillRef idx="1">
-            <a:schemeClr val="accent1"/>
-          </a:fillRef>
-          <a:effectRef idx="0">
-            <a:schemeClr val="accent1"/>
-          </a:effectRef>
-          <a:fontRef idx="minor">
-            <a:schemeClr val="lt1"/>
-          </a:fontRef>
-        </p:style>
-        <p:txBody>
-          <a:bodyPr rtlCol="0" anchor="ctr"/>
-          <a:lstStyle/>
-          <a:p>
-            <a:pPr algn="ctr"/>
-            <a:endParaRPr lang="ko-KR" altLang="en-US"/>
-          </a:p>
-        </p:txBody>
-      </p:sp>
-      <p:sp>
-        <p:nvSpPr>
-          <p:cNvPr id="1302" name="자유형 1301"/>
-          <p:cNvSpPr/>
-          <p:nvPr/>
-        </p:nvSpPr>
-        <p:spPr>
-          <a:xfrm>
-            <a:off x="1" y="0"/>
-            <a:ext cx="6794939" cy="1055077"/>
-          </a:xfrm>
-          <a:custGeom>
-            <a:avLst/>
-            <a:gdLst>
-              <a:gd name="connsiteX0" fmla="*/ 0 w 6794939"/>
-              <a:gd name="connsiteY0" fmla="*/ 0 h 1198179"/>
-              <a:gd name="connsiteX1" fmla="*/ 299546 w 6794939"/>
-              <a:gd name="connsiteY1" fmla="*/ 0 h 1198179"/>
-              <a:gd name="connsiteX2" fmla="*/ 1418897 w 6794939"/>
-              <a:gd name="connsiteY2" fmla="*/ 0 h 1198179"/>
-              <a:gd name="connsiteX3" fmla="*/ 6794939 w 6794939"/>
-              <a:gd name="connsiteY3" fmla="*/ 0 h 1198179"/>
-              <a:gd name="connsiteX4" fmla="*/ 6495394 w 6794939"/>
-              <a:gd name="connsiteY4" fmla="*/ 1198179 h 1198179"/>
-              <a:gd name="connsiteX5" fmla="*/ 1418897 w 6794939"/>
-              <a:gd name="connsiteY5" fmla="*/ 1198179 h 1198179"/>
-              <a:gd name="connsiteX6" fmla="*/ 1 w 6794939"/>
-              <a:gd name="connsiteY6" fmla="*/ 1198179 h 1198179"/>
-              <a:gd name="connsiteX7" fmla="*/ 0 w 6794939"/>
-              <a:gd name="connsiteY7" fmla="*/ 1198179 h 1198179"/>
-              <a:gd name="connsiteX0" fmla="*/ 0 w 6794939"/>
-              <a:gd name="connsiteY0" fmla="*/ 0 h 1213945"/>
-              <a:gd name="connsiteX1" fmla="*/ 299546 w 6794939"/>
-              <a:gd name="connsiteY1" fmla="*/ 0 h 1213945"/>
-              <a:gd name="connsiteX2" fmla="*/ 1418897 w 6794939"/>
-              <a:gd name="connsiteY2" fmla="*/ 0 h 1213945"/>
-              <a:gd name="connsiteX3" fmla="*/ 6794939 w 6794939"/>
-              <a:gd name="connsiteY3" fmla="*/ 0 h 1213945"/>
-              <a:gd name="connsiteX4" fmla="*/ 5990898 w 6794939"/>
-              <a:gd name="connsiteY4" fmla="*/ 1213945 h 1213945"/>
-              <a:gd name="connsiteX5" fmla="*/ 1418897 w 6794939"/>
-              <a:gd name="connsiteY5" fmla="*/ 1198179 h 1213945"/>
-              <a:gd name="connsiteX6" fmla="*/ 1 w 6794939"/>
-              <a:gd name="connsiteY6" fmla="*/ 1198179 h 1213945"/>
-              <a:gd name="connsiteX7" fmla="*/ 0 w 6794939"/>
-              <a:gd name="connsiteY7" fmla="*/ 1198179 h 1213945"/>
-              <a:gd name="connsiteX8" fmla="*/ 0 w 6794939"/>
-              <a:gd name="connsiteY8" fmla="*/ 0 h 1213945"/>
-            </a:gdLst>
-            <a:ahLst/>
-            <a:cxnLst>
-              <a:cxn ang="0">
-                <a:pos x="connsiteX0" y="connsiteY0"/>
-              </a:cxn>
-              <a:cxn ang="0">
-                <a:pos x="connsiteX1" y="connsiteY1"/>
-              </a:cxn>
-              <a:cxn ang="0">
-                <a:pos x="connsiteX2" y="connsiteY2"/>
-              </a:cxn>
-              <a:cxn ang="0">
-                <a:pos x="connsiteX3" y="connsiteY3"/>
-              </a:cxn>
-              <a:cxn ang="0">
-                <a:pos x="connsiteX4" y="connsiteY4"/>
-              </a:cxn>
-              <a:cxn ang="0">
-                <a:pos x="connsiteX5" y="connsiteY5"/>
-              </a:cxn>
-              <a:cxn ang="0">
-                <a:pos x="connsiteX6" y="connsiteY6"/>
-              </a:cxn>
-              <a:cxn ang="0">
-                <a:pos x="connsiteX7" y="connsiteY7"/>
-              </a:cxn>
-              <a:cxn ang="0">
-                <a:pos x="connsiteX8" y="connsiteY8"/>
-              </a:cxn>
-            </a:cxnLst>
-            <a:rect l="l" t="t" r="r" b="b"/>
-            <a:pathLst>
-              <a:path w="6794939" h="1213945">
-                <a:moveTo>
-                  <a:pt x="0" y="0"/>
-                </a:moveTo>
-                <a:lnTo>
-                  <a:pt x="299546" y="0"/>
-                </a:lnTo>
-                <a:lnTo>
-                  <a:pt x="1418897" y="0"/>
-                </a:lnTo>
-                <a:lnTo>
-                  <a:pt x="6794939" y="0"/>
-                </a:lnTo>
-                <a:lnTo>
-                  <a:pt x="5990898" y="1213945"/>
-                </a:lnTo>
-                <a:lnTo>
-                  <a:pt x="1418897" y="1198179"/>
-                </a:lnTo>
-                <a:lnTo>
-                  <a:pt x="1" y="1198179"/>
-                </a:lnTo>
-                <a:lnTo>
-                  <a:pt x="0" y="1198179"/>
-                </a:lnTo>
-                <a:lnTo>
-                  <a:pt x="0" y="0"/>
-                </a:lnTo>
-                <a:close/>
-              </a:path>
-            </a:pathLst>
-          </a:custGeom>
-          <a:solidFill>
-            <a:schemeClr val="accent1">
-              <a:lumMod val="50000"/>
-            </a:schemeClr>
-          </a:solidFill>
-          <a:ln>
-            <a:noFill/>
-          </a:ln>
-          <a:effectLst>
-            <a:outerShdw blurRad="50800" dist="38100" dir="2700000" algn="tl" rotWithShape="0">
-              <a:prstClr val="black">
-                <a:alpha val="40000"/>
-              </a:prstClr>
-            </a:outerShdw>
-          </a:effectLst>
-        </p:spPr>
-        <p:style>
-          <a:lnRef idx="2">
-            <a:schemeClr val="accent1">
-              <a:shade val="50000"/>
-            </a:schemeClr>
-          </a:lnRef>
-          <a:fillRef idx="1">
-            <a:schemeClr val="accent1"/>
-          </a:fillRef>
-          <a:effectRef idx="0">
-            <a:schemeClr val="accent1"/>
-          </a:effectRef>
-          <a:fontRef idx="minor">
-            <a:schemeClr val="lt1"/>
-          </a:fontRef>
-        </p:style>
-        <p:txBody>
-          <a:bodyPr rtlCol="0" anchor="ctr"/>
-          <a:lstStyle/>
-          <a:p>
-            <a:pPr algn="ctr"/>
-            <a:endParaRPr lang="ko-KR" altLang="en-US"/>
-          </a:p>
-        </p:txBody>
-      </p:sp>
-      <p:grpSp>
-        <p:nvGrpSpPr>
-          <p:cNvPr id="69" name="그룹 68"/>
-          <p:cNvGrpSpPr/>
-          <p:nvPr/>
-        </p:nvGrpSpPr>
-        <p:grpSpPr>
-          <a:xfrm>
-            <a:off x="158912" y="227235"/>
-            <a:ext cx="619733" cy="600612"/>
-            <a:chOff x="5529832" y="2009720"/>
-            <a:chExt cx="1116066" cy="1121808"/>
-          </a:xfrm>
-          <a:effectLst>
-            <a:outerShdw blurRad="50800" dist="38100" dir="2700000" algn="tl" rotWithShape="0">
-              <a:prstClr val="black">
-                <a:alpha val="40000"/>
-              </a:prstClr>
-            </a:outerShdw>
-          </a:effectLst>
-        </p:grpSpPr>
-        <p:sp>
-          <p:nvSpPr>
-            <p:cNvPr id="70" name="타원 69"/>
-            <p:cNvSpPr/>
-            <p:nvPr/>
-          </p:nvSpPr>
-          <p:spPr>
-            <a:xfrm>
-              <a:off x="5529832" y="2009720"/>
-              <a:ext cx="1116066" cy="1121808"/>
-            </a:xfrm>
-            <a:prstGeom prst="ellipse">
-              <a:avLst/>
-            </a:prstGeom>
-            <a:noFill/>
-            <a:ln w="38100">
-              <a:solidFill>
-                <a:schemeClr val="bg1"/>
-              </a:solidFill>
-            </a:ln>
-          </p:spPr>
-          <p:style>
-            <a:lnRef idx="2">
-              <a:schemeClr val="accent1">
-                <a:shade val="50000"/>
-              </a:schemeClr>
-            </a:lnRef>
-            <a:fillRef idx="1">
-              <a:schemeClr val="accent1"/>
-            </a:fillRef>
-            <a:effectRef idx="0">
-              <a:schemeClr val="accent1"/>
-            </a:effectRef>
-            <a:fontRef idx="minor">
-              <a:schemeClr val="lt1"/>
-            </a:fontRef>
-          </p:style>
-          <p:txBody>
-            <a:bodyPr rtlCol="0" anchor="ctr"/>
-            <a:lstStyle/>
-            <a:p>
-              <a:pPr algn="ctr"/>
-              <a:endParaRPr lang="ko-KR" altLang="en-US"/>
-            </a:p>
-          </p:txBody>
-        </p:sp>
-        <p:pic>
-          <p:nvPicPr>
-            <p:cNvPr id="71" name="그림 70"/>
-            <p:cNvPicPr>
-              <a:picLocks noChangeAspect="1"/>
-            </p:cNvPicPr>
-            <p:nvPr/>
-          </p:nvPicPr>
-          <p:blipFill>
-            <a:blip r:embed="rId2" cstate="print">
-              <a:extLst>
-                <a:ext uri="{28A0092B-C50C-407E-A947-70E740481C1C}">
-                  <a14:useLocalDpi xmlns:a14="http://schemas.microsoft.com/office/drawing/2010/main" val="0"/>
-                </a:ext>
-              </a:extLst>
-            </a:blip>
-            <a:stretch>
-              <a:fillRect/>
-            </a:stretch>
-          </p:blipFill>
-          <p:spPr>
-            <a:xfrm>
-              <a:off x="5697130" y="2329062"/>
-              <a:ext cx="795554" cy="509031"/>
-            </a:xfrm>
-            <a:prstGeom prst="rect">
-              <a:avLst/>
-            </a:prstGeom>
-          </p:spPr>
-        </p:pic>
-      </p:grpSp>
-      <p:sp>
-        <p:nvSpPr>
-          <p:cNvPr id="22" name="직사각형 21"/>
-          <p:cNvSpPr/>
-          <p:nvPr/>
-        </p:nvSpPr>
-        <p:spPr>
-          <a:xfrm>
-            <a:off x="8910608" y="-8817"/>
-            <a:ext cx="3303931" cy="6858000"/>
-          </a:xfrm>
-          <a:prstGeom prst="rect">
-            <a:avLst/>
-          </a:prstGeom>
-          <a:solidFill>
-            <a:schemeClr val="tx2">
-              <a:lumMod val="75000"/>
-            </a:schemeClr>
-          </a:solidFill>
-          <a:ln>
-            <a:noFill/>
-          </a:ln>
-        </p:spPr>
-        <p:style>
-          <a:lnRef idx="2">
-            <a:schemeClr val="accent1">
-              <a:shade val="50000"/>
-            </a:schemeClr>
-          </a:lnRef>
-          <a:fillRef idx="1">
-            <a:schemeClr val="accent1"/>
-          </a:fillRef>
-          <a:effectRef idx="0">
-            <a:schemeClr val="accent1"/>
-          </a:effectRef>
-          <a:fontRef idx="minor">
-            <a:schemeClr val="lt1"/>
-          </a:fontRef>
-        </p:style>
-        <p:txBody>
-          <a:bodyPr rtlCol="0" anchor="ctr"/>
-          <a:lstStyle/>
-          <a:p>
-            <a:pPr algn="ctr"/>
-            <a:endParaRPr lang="ko-KR" altLang="en-US" sz="2200" dirty="0"/>
-          </a:p>
-        </p:txBody>
-      </p:sp>
-      <p:sp>
-        <p:nvSpPr>
-          <p:cNvPr id="23" name="직각 삼각형 22"/>
-          <p:cNvSpPr/>
-          <p:nvPr/>
-        </p:nvSpPr>
-        <p:spPr>
-          <a:xfrm flipH="1">
-            <a:off x="10312768" y="5029200"/>
-            <a:ext cx="1901777" cy="1828800"/>
-          </a:xfrm>
-          <a:prstGeom prst="rtTriangle">
-            <a:avLst/>
-          </a:prstGeom>
-          <a:solidFill>
-            <a:schemeClr val="bg1"/>
-          </a:solidFill>
-          <a:ln>
-            <a:noFill/>
-          </a:ln>
-        </p:spPr>
-        <p:style>
-          <a:lnRef idx="2">
-            <a:schemeClr val="accent1">
-              <a:shade val="50000"/>
-            </a:schemeClr>
-          </a:lnRef>
-          <a:fillRef idx="1">
-            <a:schemeClr val="accent1"/>
-          </a:fillRef>
-          <a:effectRef idx="0">
-            <a:schemeClr val="accent1"/>
-          </a:effectRef>
-          <a:fontRef idx="minor">
-            <a:schemeClr val="lt1"/>
-          </a:fontRef>
-        </p:style>
-        <p:txBody>
-          <a:bodyPr rtlCol="0" anchor="ctr"/>
-          <a:lstStyle/>
-          <a:p>
-            <a:pPr algn="ctr"/>
-            <a:endParaRPr lang="ko-KR" altLang="en-US"/>
-          </a:p>
-        </p:txBody>
-      </p:sp>
-      <p:sp>
-        <p:nvSpPr>
-          <p:cNvPr id="4" name="제목 3"/>
-          <p:cNvSpPr>
-            <a:spLocks noGrp="1"/>
-          </p:cNvSpPr>
-          <p:nvPr>
-            <p:ph type="title"/>
-          </p:nvPr>
-        </p:nvSpPr>
-        <p:spPr>
-          <a:xfrm>
-            <a:off x="838200" y="264837"/>
-            <a:ext cx="10515600" cy="1325563"/>
-          </a:xfrm>
-        </p:spPr>
-        <p:txBody>
-          <a:bodyPr/>
-          <a:lstStyle/>
-          <a:p>
-            <a:r>
-              <a:rPr lang="ko-KR" altLang="en-US" sz="3200" dirty="0" smtClean="0">
-                <a:solidFill>
-                  <a:schemeClr val="bg1"/>
-                </a:solidFill>
-              </a:rPr>
-              <a:t>남은 기간 동안 할 것</a:t>
-            </a:r>
-            <a:endParaRPr lang="ko-KR" altLang="en-US" sz="3200" dirty="0">
-              <a:solidFill>
-                <a:schemeClr val="bg1"/>
-              </a:solidFill>
-            </a:endParaRPr>
-          </a:p>
-        </p:txBody>
-      </p:sp>
-      <p:sp>
-        <p:nvSpPr>
-          <p:cNvPr id="11" name="TextBox 10"/>
-          <p:cNvSpPr txBox="1"/>
-          <p:nvPr/>
-        </p:nvSpPr>
-        <p:spPr>
-          <a:xfrm>
-            <a:off x="3255469" y="2986634"/>
-            <a:ext cx="2755687" cy="646331"/>
-          </a:xfrm>
-          <a:prstGeom prst="rect">
-            <a:avLst/>
-          </a:prstGeom>
-          <a:noFill/>
-        </p:spPr>
-        <p:txBody>
-          <a:bodyPr wrap="square" rtlCol="0">
-            <a:spAutoFit/>
-          </a:bodyPr>
-          <a:lstStyle/>
-          <a:p>
-            <a:r>
-              <a:rPr lang="en-US" altLang="ko-KR" dirty="0" smtClean="0">
-                <a:solidFill>
-                  <a:schemeClr val="bg1"/>
-                </a:solidFill>
-              </a:rPr>
-              <a:t>Test </a:t>
-            </a:r>
-            <a:r>
-              <a:rPr lang="ko-KR" altLang="en-US" dirty="0" smtClean="0">
-                <a:solidFill>
-                  <a:schemeClr val="bg1"/>
-                </a:solidFill>
-              </a:rPr>
-              <a:t>및 </a:t>
-            </a:r>
-            <a:endParaRPr lang="en-US" altLang="ko-KR" dirty="0" smtClean="0">
-              <a:solidFill>
-                <a:schemeClr val="bg1"/>
-              </a:solidFill>
-            </a:endParaRPr>
-          </a:p>
-          <a:p>
-            <a:r>
-              <a:rPr lang="ko-KR" altLang="en-US" dirty="0" smtClean="0">
-                <a:solidFill>
-                  <a:schemeClr val="bg1"/>
-                </a:solidFill>
-              </a:rPr>
-              <a:t>홍보 </a:t>
-            </a:r>
-            <a:r>
-              <a:rPr lang="ko-KR" altLang="en-US" dirty="0" smtClean="0">
-                <a:solidFill>
-                  <a:schemeClr val="bg1"/>
-                </a:solidFill>
-              </a:rPr>
-              <a:t>시작</a:t>
-            </a:r>
-            <a:endParaRPr lang="en-US" altLang="ko-KR" dirty="0">
-              <a:solidFill>
-                <a:schemeClr val="bg1"/>
-              </a:solidFill>
-            </a:endParaRPr>
-          </a:p>
-        </p:txBody>
-      </p:sp>
-    </p:spTree>
-    <p:extLst>
-      <p:ext uri="{BB962C8B-B14F-4D97-AF65-F5344CB8AC3E}">
-        <p14:creationId xmlns:p14="http://schemas.microsoft.com/office/powerpoint/2010/main" val="3740269144"/>
-      </p:ext>
-    </p:extLst>
-  </p:cSld>
-  <p:clrMapOvr>
-    <a:masterClrMapping/>
-  </p:clrMapOvr>
-  <p:timing>
-    <p:tnLst>
-      <p:par>
-        <p:cTn id="1" dur="indefinite" restart="never" nodeType="tmRoot">
-          <p:childTnLst>
-            <p:seq concurrent="1" nextAc="seek">
-              <p:cTn id="2" dur="indefinite" nodeType="mainSeq">
-                <p:childTnLst>
-                  <p:par>
-                    <p:cTn id="3" fill="hold">
-                      <p:stCondLst>
-                        <p:cond delay="indefinite"/>
-                        <p:cond evt="onBegin" delay="0">
-                          <p:tn val="2"/>
-                        </p:cond>
-                      </p:stCondLst>
-                      <p:childTnLst>
-                        <p:par>
-                          <p:cTn id="4" fill="hold">
-                            <p:stCondLst>
-                              <p:cond delay="0"/>
-                            </p:stCondLst>
-                            <p:childTnLst>
-                              <p:par>
-                                <p:cTn id="5" presetID="2" presetClass="entr" presetSubtype="2" fill="hold" grpId="0" nodeType="withEffect">
-                                  <p:stCondLst>
-                                    <p:cond delay="0"/>
-                                  </p:stCondLst>
-                                  <p:childTnLst>
-                                    <p:set>
-                                      <p:cBhvr>
-                                        <p:cTn id="6" dur="1" fill="hold">
-                                          <p:stCondLst>
-                                            <p:cond delay="0"/>
-                                          </p:stCondLst>
-                                        </p:cTn>
-                                        <p:tgtEl>
-                                          <p:spTgt spid="22"/>
-                                        </p:tgtEl>
-                                        <p:attrNameLst>
-                                          <p:attrName>style.visibility</p:attrName>
-                                        </p:attrNameLst>
-                                      </p:cBhvr>
-                                      <p:to>
-                                        <p:strVal val="visible"/>
-                                      </p:to>
-                                    </p:set>
-                                    <p:anim calcmode="lin" valueType="num">
-                                      <p:cBhvr additive="base">
-                                        <p:cTn id="7" dur="500" fill="hold"/>
-                                        <p:tgtEl>
-                                          <p:spTgt spid="22"/>
-                                        </p:tgtEl>
-                                        <p:attrNameLst>
-                                          <p:attrName>ppt_x</p:attrName>
-                                        </p:attrNameLst>
-                                      </p:cBhvr>
-                                      <p:tavLst>
-                                        <p:tav tm="0">
-                                          <p:val>
-                                            <p:strVal val="1+#ppt_w/2"/>
-                                          </p:val>
-                                        </p:tav>
-                                        <p:tav tm="100000">
-                                          <p:val>
-                                            <p:strVal val="#ppt_x"/>
-                                          </p:val>
-                                        </p:tav>
-                                      </p:tavLst>
-                                    </p:anim>
-                                    <p:anim calcmode="lin" valueType="num">
-                                      <p:cBhvr additive="base">
-                                        <p:cTn id="8" dur="500" fill="hold"/>
-                                        <p:tgtEl>
-                                          <p:spTgt spid="22"/>
-                                        </p:tgtEl>
-                                        <p:attrNameLst>
-                                          <p:attrName>ppt_y</p:attrName>
-                                        </p:attrNameLst>
-                                      </p:cBhvr>
-                                      <p:tavLst>
-                                        <p:tav tm="0">
-                                          <p:val>
-                                            <p:strVal val="#ppt_y"/>
-                                          </p:val>
-                                        </p:tav>
-                                        <p:tav tm="100000">
-                                          <p:val>
-                                            <p:strVal val="#ppt_y"/>
-                                          </p:val>
-                                        </p:tav>
-                                      </p:tavLst>
-                                    </p:anim>
-                                  </p:childTnLst>
-                                </p:cTn>
-                              </p:par>
-                              <p:par>
-                                <p:cTn id="9" presetID="42" presetClass="entr" presetSubtype="0" fill="hold" grpId="0" nodeType="withEffect">
-                                  <p:stCondLst>
-                                    <p:cond delay="500"/>
-                                  </p:stCondLst>
-                                  <p:childTnLst>
-                                    <p:set>
-                                      <p:cBhvr>
-                                        <p:cTn id="10" dur="1" fill="hold">
-                                          <p:stCondLst>
-                                            <p:cond delay="0"/>
-                                          </p:stCondLst>
-                                        </p:cTn>
-                                        <p:tgtEl>
-                                          <p:spTgt spid="23"/>
-                                        </p:tgtEl>
-                                        <p:attrNameLst>
-                                          <p:attrName>style.visibility</p:attrName>
-                                        </p:attrNameLst>
-                                      </p:cBhvr>
-                                      <p:to>
-                                        <p:strVal val="visible"/>
-                                      </p:to>
-                                    </p:set>
-                                    <p:animEffect transition="in" filter="fade">
-                                      <p:cBhvr>
-                                        <p:cTn id="11" dur="1000"/>
-                                        <p:tgtEl>
-                                          <p:spTgt spid="23"/>
-                                        </p:tgtEl>
-                                      </p:cBhvr>
-                                    </p:animEffect>
-                                    <p:anim calcmode="lin" valueType="num">
-                                      <p:cBhvr>
-                                        <p:cTn id="12" dur="1000" fill="hold"/>
-                                        <p:tgtEl>
-                                          <p:spTgt spid="23"/>
-                                        </p:tgtEl>
-                                        <p:attrNameLst>
-                                          <p:attrName>ppt_x</p:attrName>
-                                        </p:attrNameLst>
-                                      </p:cBhvr>
-                                      <p:tavLst>
-                                        <p:tav tm="0">
-                                          <p:val>
-                                            <p:strVal val="#ppt_x"/>
-                                          </p:val>
-                                        </p:tav>
-                                        <p:tav tm="100000">
-                                          <p:val>
-                                            <p:strVal val="#ppt_x"/>
-                                          </p:val>
-                                        </p:tav>
-                                      </p:tavLst>
-                                    </p:anim>
-                                    <p:anim calcmode="lin" valueType="num">
-                                      <p:cBhvr>
-                                        <p:cTn id="13" dur="1000" fill="hold"/>
-                                        <p:tgtEl>
-                                          <p:spTgt spid="23"/>
-                                        </p:tgtEl>
-                                        <p:attrNameLst>
-                                          <p:attrName>ppt_y</p:attrName>
-                                        </p:attrNameLst>
-                                      </p:cBhvr>
-                                      <p:tavLst>
-                                        <p:tav tm="0">
-                                          <p:val>
-                                            <p:strVal val="#ppt_y+.1"/>
-                                          </p:val>
-                                        </p:tav>
-                                        <p:tav tm="100000">
-                                          <p:val>
-                                            <p:strVal val="#ppt_y"/>
-                                          </p:val>
-                                        </p:tav>
-                                      </p:tavLst>
-                                    </p:anim>
-                                  </p:childTnLst>
-                                </p:cTn>
-                              </p:par>
-                              <p:par>
-                                <p:cTn id="14" presetID="10" presetClass="entr" presetSubtype="0" fill="hold" grpId="0" nodeType="withEffect">
-                                  <p:stCondLst>
-                                    <p:cond delay="500"/>
-                                  </p:stCondLst>
-                                  <p:childTnLst>
-                                    <p:set>
-                                      <p:cBhvr>
-                                        <p:cTn id="15" dur="1" fill="hold">
-                                          <p:stCondLst>
-                                            <p:cond delay="0"/>
-                                          </p:stCondLst>
-                                        </p:cTn>
-                                        <p:tgtEl>
-                                          <p:spTgt spid="11"/>
-                                        </p:tgtEl>
-                                        <p:attrNameLst>
-                                          <p:attrName>style.visibility</p:attrName>
-                                        </p:attrNameLst>
-                                      </p:cBhvr>
-                                      <p:to>
-                                        <p:strVal val="visible"/>
-                                      </p:to>
-                                    </p:set>
-                                    <p:animEffect transition="in" filter="fade">
-                                      <p:cBhvr>
-                                        <p:cTn id="16" dur="500"/>
-                                        <p:tgtEl>
-                                          <p:spTgt spid="11"/>
-                                        </p:tgtEl>
-                                      </p:cBhvr>
-                                    </p:animEffect>
-                                  </p:childTnLst>
-                                </p:cTn>
-                              </p:par>
-                            </p:childTnLst>
-                          </p:cTn>
-                        </p:par>
-                      </p:childTnLst>
-                    </p:cTn>
-                  </p:par>
-                </p:childTnLst>
-              </p:cTn>
-              <p:prevCondLst>
-                <p:cond evt="onPrev" delay="0">
-                  <p:tgtEl>
-                    <p:sldTgt/>
-                  </p:tgtEl>
-                </p:cond>
-              </p:prevCondLst>
-              <p:nextCondLst>
-                <p:cond evt="onNext" delay="0">
-                  <p:tgtEl>
-                    <p:sldTgt/>
-                  </p:tgtEl>
-                </p:cond>
-              </p:nextCondLst>
-            </p:seq>
-          </p:childTnLst>
-        </p:cTn>
-      </p:par>
-    </p:tnLst>
-    <p:bldLst>
-      <p:bldP spid="22" grpId="0" animBg="1"/>
-      <p:bldP spid="23" grpId="0" animBg="1"/>
-      <p:bldP spid="11" grpId="0"/>
-    </p:bldLst>
-  </p:timing>
-</p:sld>
-</file>
-
-<file path=ppt/slides/slide8.xml><?xml version="1.0" encoding="utf-8"?>
 <p:sld xmlns:a="http://schemas.openxmlformats.org/drawingml/2006/main" xmlns:r="http://schemas.openxmlformats.org/officeDocument/2006/relationships" xmlns:p="http://schemas.openxmlformats.org/presentationml/2006/main">
   <p:cSld>
     <p:spTree>

</xml_diff>